<commit_message>
Increase team member name contrast on title page
</commit_message>
<xml_diff>
--- a/Introductory_Slides.pptx
+++ b/Introductory_Slides.pptx
@@ -310,7 +310,7 @@
           <a:p>
             <a:fld id="{C2EF7422-D2C7-40BE-B8B2-27F6F564B2F4}" type="datetimeFigureOut">
               <a:rPr lang="en-GB" smtClean="0"/>
-              <a:t>21/10/2023</a:t>
+              <a:t>23/10/2023</a:t>
             </a:fld>
             <a:endParaRPr lang="en-GB"/>
           </a:p>
@@ -531,7 +531,7 @@
           <a:p>
             <a:fld id="{C2EF7422-D2C7-40BE-B8B2-27F6F564B2F4}" type="datetimeFigureOut">
               <a:rPr lang="en-GB" smtClean="0"/>
-              <a:t>21/10/2023</a:t>
+              <a:t>23/10/2023</a:t>
             </a:fld>
             <a:endParaRPr lang="en-GB"/>
           </a:p>
@@ -711,7 +711,7 @@
           <a:p>
             <a:fld id="{C2EF7422-D2C7-40BE-B8B2-27F6F564B2F4}" type="datetimeFigureOut">
               <a:rPr lang="en-GB" smtClean="0"/>
-              <a:t>21/10/2023</a:t>
+              <a:t>23/10/2023</a:t>
             </a:fld>
             <a:endParaRPr lang="en-GB"/>
           </a:p>
@@ -881,7 +881,7 @@
           <a:p>
             <a:fld id="{C2EF7422-D2C7-40BE-B8B2-27F6F564B2F4}" type="datetimeFigureOut">
               <a:rPr lang="en-GB" smtClean="0"/>
-              <a:t>21/10/2023</a:t>
+              <a:t>23/10/2023</a:t>
             </a:fld>
             <a:endParaRPr lang="en-GB"/>
           </a:p>
@@ -1132,7 +1132,7 @@
           <a:p>
             <a:fld id="{C2EF7422-D2C7-40BE-B8B2-27F6F564B2F4}" type="datetimeFigureOut">
               <a:rPr lang="en-GB" smtClean="0"/>
-              <a:t>21/10/2023</a:t>
+              <a:t>23/10/2023</a:t>
             </a:fld>
             <a:endParaRPr lang="en-GB"/>
           </a:p>
@@ -1455,7 +1455,7 @@
           <a:p>
             <a:fld id="{C2EF7422-D2C7-40BE-B8B2-27F6F564B2F4}" type="datetimeFigureOut">
               <a:rPr lang="en-GB" smtClean="0"/>
-              <a:t>21/10/2023</a:t>
+              <a:t>23/10/2023</a:t>
             </a:fld>
             <a:endParaRPr lang="en-GB"/>
           </a:p>
@@ -1879,7 +1879,7 @@
           <a:p>
             <a:fld id="{C2EF7422-D2C7-40BE-B8B2-27F6F564B2F4}" type="datetimeFigureOut">
               <a:rPr lang="en-GB" smtClean="0"/>
-              <a:t>21/10/2023</a:t>
+              <a:t>23/10/2023</a:t>
             </a:fld>
             <a:endParaRPr lang="en-GB"/>
           </a:p>
@@ -1997,7 +1997,7 @@
           <a:p>
             <a:fld id="{C2EF7422-D2C7-40BE-B8B2-27F6F564B2F4}" type="datetimeFigureOut">
               <a:rPr lang="en-GB" smtClean="0"/>
-              <a:t>21/10/2023</a:t>
+              <a:t>23/10/2023</a:t>
             </a:fld>
             <a:endParaRPr lang="en-GB"/>
           </a:p>
@@ -2092,7 +2092,7 @@
           <a:p>
             <a:fld id="{C2EF7422-D2C7-40BE-B8B2-27F6F564B2F4}" type="datetimeFigureOut">
               <a:rPr lang="en-GB" smtClean="0"/>
-              <a:t>21/10/2023</a:t>
+              <a:t>23/10/2023</a:t>
             </a:fld>
             <a:endParaRPr lang="en-GB"/>
           </a:p>
@@ -2382,7 +2382,7 @@
           <a:p>
             <a:fld id="{C2EF7422-D2C7-40BE-B8B2-27F6F564B2F4}" type="datetimeFigureOut">
               <a:rPr lang="en-GB" smtClean="0"/>
-              <a:t>21/10/2023</a:t>
+              <a:t>23/10/2023</a:t>
             </a:fld>
             <a:endParaRPr lang="en-GB"/>
           </a:p>
@@ -2654,7 +2654,7 @@
           <a:p>
             <a:fld id="{C2EF7422-D2C7-40BE-B8B2-27F6F564B2F4}" type="datetimeFigureOut">
               <a:rPr lang="en-GB" smtClean="0"/>
-              <a:t>21/10/2023</a:t>
+              <a:t>23/10/2023</a:t>
             </a:fld>
             <a:endParaRPr lang="en-GB"/>
           </a:p>
@@ -2908,7 +2908,7 @@
           <a:p>
             <a:fld id="{C2EF7422-D2C7-40BE-B8B2-27F6F564B2F4}" type="datetimeFigureOut">
               <a:rPr lang="en-GB" smtClean="0"/>
-              <a:t>21/10/2023</a:t>
+              <a:t>23/10/2023</a:t>
             </a:fld>
             <a:endParaRPr lang="en-GB"/>
           </a:p>
@@ -3414,72 +3414,62 @@
             <p:ph type="subTitle" idx="1"/>
           </p:nvPr>
         </p:nvSpPr>
-        <p:spPr/>
+        <p:spPr>
+          <a:xfrm>
+            <a:off x="1109980" y="3978963"/>
+            <a:ext cx="9966960" cy="1388165"/>
+          </a:xfrm>
+        </p:spPr>
         <p:txBody>
           <a:bodyPr>
-            <a:normAutofit fontScale="55000" lnSpcReduction="20000"/>
+            <a:noAutofit/>
           </a:bodyPr>
           <a:lstStyle/>
           <a:p>
-            <a:pPr algn="l"/>
-            <a:r>
-              <a:rPr lang="en-GB" dirty="0">
+            <a:r>
+              <a:rPr lang="en-GB" sz="1600" b="1" dirty="0">
                 <a:solidFill>
-                  <a:schemeClr val="bg1">
-                    <a:lumMod val="65000"/>
-                  </a:schemeClr>
+                  <a:schemeClr val="tx1"/>
                 </a:solidFill>
               </a:rPr>
               <a:t>Brought to you by:</a:t>
             </a:r>
           </a:p>
           <a:p>
-            <a:pPr algn="l"/>
-            <a:r>
-              <a:rPr lang="en-GB" sz="1900" dirty="0">
+            <a:r>
+              <a:rPr lang="en-GB" sz="1200" dirty="0">
                 <a:solidFill>
-                  <a:schemeClr val="bg1">
-                    <a:lumMod val="65000"/>
-                  </a:schemeClr>
+                  <a:schemeClr val="tx1"/>
                 </a:solidFill>
               </a:rPr>
               <a:t>Jordan Conway</a:t>
             </a:r>
           </a:p>
           <a:p>
-            <a:pPr algn="l"/>
-            <a:r>
-              <a:rPr lang="en-GB" sz="1900" dirty="0">
+            <a:r>
+              <a:rPr lang="en-GB" sz="1200" dirty="0">
                 <a:solidFill>
-                  <a:schemeClr val="bg1">
-                    <a:lumMod val="65000"/>
-                  </a:schemeClr>
+                  <a:schemeClr val="tx1"/>
                 </a:solidFill>
               </a:rPr>
               <a:t>Méabh Gibney</a:t>
             </a:r>
           </a:p>
           <a:p>
-            <a:pPr algn="l"/>
-            <a:r>
-              <a:rPr lang="en-GB" sz="1900" dirty="0">
+            <a:r>
+              <a:rPr lang="en-GB" sz="1200" dirty="0">
                 <a:solidFill>
-                  <a:schemeClr val="bg1">
-                    <a:lumMod val="65000"/>
-                  </a:schemeClr>
+                  <a:schemeClr val="tx1"/>
                 </a:solidFill>
               </a:rPr>
               <a:t>Jason Njoku</a:t>
             </a:r>
           </a:p>
           <a:p>
-            <a:pPr algn="l"/>
-            <a:r>
-              <a:rPr lang="en-GB" sz="1900" dirty="0">
+            <a:r>
+              <a:rPr lang="en-GB" sz="1200" dirty="0">
                 <a:solidFill>
-                  <a:schemeClr val="bg1">
-                    <a:lumMod val="65000"/>
-                  </a:schemeClr>
+                  <a:schemeClr val="tx1"/>
                 </a:solidFill>
               </a:rPr>
               <a:t>Cian Ashby</a:t>

</xml_diff>

<commit_message>
Remove design on introductory slides pptx
This makes the introductory slides match the style of all other slides
</commit_message>
<xml_diff>
--- a/Introductory_Slides.pptx
+++ b/Introductory_Slides.pptx
@@ -2,7 +2,7 @@
 <file path=ppt/presentation.xml><?xml version="1.0" encoding="utf-8"?>
 <p:presentation xmlns:a="http://schemas.openxmlformats.org/drawingml/2006/main" xmlns:r="http://schemas.openxmlformats.org/officeDocument/2006/relationships" xmlns:p="http://schemas.openxmlformats.org/presentationml/2006/main" saveSubsetFonts="1">
   <p:sldMasterIdLst>
-    <p:sldMasterId id="2147483708" r:id="rId1"/>
+    <p:sldMasterId id="2147483720" r:id="rId1"/>
   </p:sldMasterIdLst>
   <p:sldIdLst>
     <p:sldId id="256" r:id="rId2"/>
@@ -15,7 +15,7 @@
     <a:defPPr>
       <a:defRPr lang="en-US"/>
     </a:defPPr>
-    <a:lvl1pPr marL="0" algn="l" defTabSz="457200" rtl="0" eaLnBrk="1" latinLnBrk="0" hangingPunct="1">
+    <a:lvl1pPr marL="0" algn="l" defTabSz="914400" rtl="0" eaLnBrk="1" latinLnBrk="0" hangingPunct="1">
       <a:defRPr sz="1800" kern="1200">
         <a:solidFill>
           <a:schemeClr val="tx1"/>
@@ -25,7 +25,7 @@
         <a:cs typeface="+mn-cs"/>
       </a:defRPr>
     </a:lvl1pPr>
-    <a:lvl2pPr marL="457200" algn="l" defTabSz="457200" rtl="0" eaLnBrk="1" latinLnBrk="0" hangingPunct="1">
+    <a:lvl2pPr marL="457200" algn="l" defTabSz="914400" rtl="0" eaLnBrk="1" latinLnBrk="0" hangingPunct="1">
       <a:defRPr sz="1800" kern="1200">
         <a:solidFill>
           <a:schemeClr val="tx1"/>
@@ -35,7 +35,7 @@
         <a:cs typeface="+mn-cs"/>
       </a:defRPr>
     </a:lvl2pPr>
-    <a:lvl3pPr marL="914400" algn="l" defTabSz="457200" rtl="0" eaLnBrk="1" latinLnBrk="0" hangingPunct="1">
+    <a:lvl3pPr marL="914400" algn="l" defTabSz="914400" rtl="0" eaLnBrk="1" latinLnBrk="0" hangingPunct="1">
       <a:defRPr sz="1800" kern="1200">
         <a:solidFill>
           <a:schemeClr val="tx1"/>
@@ -45,7 +45,7 @@
         <a:cs typeface="+mn-cs"/>
       </a:defRPr>
     </a:lvl3pPr>
-    <a:lvl4pPr marL="1371600" algn="l" defTabSz="457200" rtl="0" eaLnBrk="1" latinLnBrk="0" hangingPunct="1">
+    <a:lvl4pPr marL="1371600" algn="l" defTabSz="914400" rtl="0" eaLnBrk="1" latinLnBrk="0" hangingPunct="1">
       <a:defRPr sz="1800" kern="1200">
         <a:solidFill>
           <a:schemeClr val="tx1"/>
@@ -55,7 +55,7 @@
         <a:cs typeface="+mn-cs"/>
       </a:defRPr>
     </a:lvl4pPr>
-    <a:lvl5pPr marL="1828800" algn="l" defTabSz="457200" rtl="0" eaLnBrk="1" latinLnBrk="0" hangingPunct="1">
+    <a:lvl5pPr marL="1828800" algn="l" defTabSz="914400" rtl="0" eaLnBrk="1" latinLnBrk="0" hangingPunct="1">
       <a:defRPr sz="1800" kern="1200">
         <a:solidFill>
           <a:schemeClr val="tx1"/>
@@ -65,7 +65,7 @@
         <a:cs typeface="+mn-cs"/>
       </a:defRPr>
     </a:lvl5pPr>
-    <a:lvl6pPr marL="2286000" algn="l" defTabSz="457200" rtl="0" eaLnBrk="1" latinLnBrk="0" hangingPunct="1">
+    <a:lvl6pPr marL="2286000" algn="l" defTabSz="914400" rtl="0" eaLnBrk="1" latinLnBrk="0" hangingPunct="1">
       <a:defRPr sz="1800" kern="1200">
         <a:solidFill>
           <a:schemeClr val="tx1"/>
@@ -75,7 +75,7 @@
         <a:cs typeface="+mn-cs"/>
       </a:defRPr>
     </a:lvl6pPr>
-    <a:lvl7pPr marL="2743200" algn="l" defTabSz="457200" rtl="0" eaLnBrk="1" latinLnBrk="0" hangingPunct="1">
+    <a:lvl7pPr marL="2743200" algn="l" defTabSz="914400" rtl="0" eaLnBrk="1" latinLnBrk="0" hangingPunct="1">
       <a:defRPr sz="1800" kern="1200">
         <a:solidFill>
           <a:schemeClr val="tx1"/>
@@ -85,7 +85,7 @@
         <a:cs typeface="+mn-cs"/>
       </a:defRPr>
     </a:lvl7pPr>
-    <a:lvl8pPr marL="3200400" algn="l" defTabSz="457200" rtl="0" eaLnBrk="1" latinLnBrk="0" hangingPunct="1">
+    <a:lvl8pPr marL="3200400" algn="l" defTabSz="914400" rtl="0" eaLnBrk="1" latinLnBrk="0" hangingPunct="1">
       <a:defRPr sz="1800" kern="1200">
         <a:solidFill>
           <a:schemeClr val="tx1"/>
@@ -95,7 +95,7 @@
         <a:cs typeface="+mn-cs"/>
       </a:defRPr>
     </a:lvl8pPr>
-    <a:lvl9pPr marL="3657600" algn="l" defTabSz="457200" rtl="0" eaLnBrk="1" latinLnBrk="0" hangingPunct="1">
+    <a:lvl9pPr marL="3657600" algn="l" defTabSz="914400" rtl="0" eaLnBrk="1" latinLnBrk="0" hangingPunct="1">
       <a:defRPr sz="1800" kern="1200">
         <a:solidFill>
           <a:schemeClr val="tx1"/>
@@ -133,147 +133,102 @@
       </p:grpSpPr>
       <p:sp>
         <p:nvSpPr>
-          <p:cNvPr id="7" name="Rectangle 6"/>
-          <p:cNvSpPr>
-            <a:spLocks noChangeAspect="1"/>
-          </p:cNvSpPr>
-          <p:nvPr/>
+          <p:cNvPr id="2" name="Title 1">
+            <a:extLst>
+              <a:ext uri="{FF2B5EF4-FFF2-40B4-BE49-F238E27FC236}">
+                <a16:creationId xmlns:a16="http://schemas.microsoft.com/office/drawing/2014/main" id="{AE6E4313-45E3-D6C1-EA7D-95DC8BCA8651}"/>
+              </a:ext>
+            </a:extLst>
+          </p:cNvPr>
+          <p:cNvSpPr>
+            <a:spLocks noGrp="1"/>
+          </p:cNvSpPr>
+          <p:nvPr>
+            <p:ph type="ctrTitle"/>
+          </p:nvPr>
         </p:nvSpPr>
         <p:spPr>
           <a:xfrm>
-            <a:off x="231140" y="243840"/>
-            <a:ext cx="11724640" cy="6377939"/>
+            <a:off x="1524000" y="1122363"/>
+            <a:ext cx="9144000" cy="2387600"/>
           </a:xfrm>
-          <a:prstGeom prst="rect">
-            <a:avLst/>
-          </a:prstGeom>
-          <a:solidFill>
-            <a:schemeClr val="accent1"/>
-          </a:solidFill>
-          <a:ln w="12700">
-            <a:solidFill>
-              <a:srgbClr val="FFFFFF"/>
-            </a:solidFill>
-          </a:ln>
         </p:spPr>
-        <p:style>
-          <a:lnRef idx="2">
-            <a:schemeClr val="accent1">
-              <a:shade val="50000"/>
-            </a:schemeClr>
-          </a:lnRef>
-          <a:fillRef idx="1">
-            <a:schemeClr val="accent1"/>
-          </a:fillRef>
-          <a:effectRef idx="0">
-            <a:schemeClr val="accent1"/>
-          </a:effectRef>
-          <a:fontRef idx="minor">
-            <a:schemeClr val="lt1"/>
-          </a:fontRef>
-        </p:style>
-      </p:sp>
-      <p:sp>
-        <p:nvSpPr>
-          <p:cNvPr id="2" name="Title 1"/>
-          <p:cNvSpPr>
-            <a:spLocks noGrp="1"/>
-          </p:cNvSpPr>
-          <p:nvPr>
-            <p:ph type="ctrTitle"/>
+        <p:txBody>
+          <a:bodyPr anchor="b"/>
+          <a:lstStyle>
+            <a:lvl1pPr algn="ctr">
+              <a:defRPr sz="6000"/>
+            </a:lvl1pPr>
+          </a:lstStyle>
+          <a:p>
+            <a:r>
+              <a:rPr lang="en-US"/>
+              <a:t>Click to edit Master title style</a:t>
+            </a:r>
+            <a:endParaRPr lang="en-GB"/>
+          </a:p>
+        </p:txBody>
+      </p:sp>
+      <p:sp>
+        <p:nvSpPr>
+          <p:cNvPr id="3" name="Subtitle 2">
+            <a:extLst>
+              <a:ext uri="{FF2B5EF4-FFF2-40B4-BE49-F238E27FC236}">
+                <a16:creationId xmlns:a16="http://schemas.microsoft.com/office/drawing/2014/main" id="{23CED956-F25C-340B-82BC-5F924DC1ADE6}"/>
+              </a:ext>
+            </a:extLst>
+          </p:cNvPr>
+          <p:cNvSpPr>
+            <a:spLocks noGrp="1"/>
+          </p:cNvSpPr>
+          <p:nvPr>
+            <p:ph type="subTitle" idx="1"/>
           </p:nvPr>
         </p:nvSpPr>
         <p:spPr>
           <a:xfrm>
-            <a:off x="1109980" y="882376"/>
-            <a:ext cx="9966960" cy="2926080"/>
+            <a:off x="1524000" y="3602038"/>
+            <a:ext cx="9144000" cy="1655762"/>
           </a:xfrm>
         </p:spPr>
         <p:txBody>
-          <a:bodyPr anchor="b">
-            <a:normAutofit/>
-          </a:bodyPr>
-          <a:lstStyle>
-            <a:lvl1pPr algn="ctr">
-              <a:lnSpc>
-                <a:spcPct val="85000"/>
-              </a:lnSpc>
-              <a:defRPr sz="7200" b="1" cap="all" baseline="0">
-                <a:solidFill>
-                  <a:srgbClr val="FFFFFF"/>
-                </a:solidFill>
-              </a:defRPr>
-            </a:lvl1pPr>
-          </a:lstStyle>
-          <a:p>
-            <a:r>
-              <a:rPr lang="en-US"/>
-              <a:t>Click to edit Master title style</a:t>
-            </a:r>
-            <a:endParaRPr lang="en-US" dirty="0"/>
-          </a:p>
-        </p:txBody>
-      </p:sp>
-      <p:sp>
-        <p:nvSpPr>
-          <p:cNvPr id="3" name="Subtitle 2"/>
-          <p:cNvSpPr>
-            <a:spLocks noGrp="1"/>
-          </p:cNvSpPr>
-          <p:nvPr>
-            <p:ph type="subTitle" idx="1"/>
-          </p:nvPr>
-        </p:nvSpPr>
-        <p:spPr>
-          <a:xfrm>
-            <a:off x="1709530" y="3869634"/>
-            <a:ext cx="8767860" cy="1388165"/>
-          </a:xfrm>
-        </p:spPr>
-        <p:txBody>
-          <a:bodyPr>
-            <a:normAutofit/>
-          </a:bodyPr>
+          <a:bodyPr/>
           <a:lstStyle>
             <a:lvl1pPr marL="0" indent="0" algn="ctr">
               <a:buNone/>
-              <a:defRPr sz="2200">
-                <a:solidFill>
-                  <a:srgbClr val="FFFFFF"/>
-                </a:solidFill>
-              </a:defRPr>
+              <a:defRPr sz="2400"/>
             </a:lvl1pPr>
             <a:lvl2pPr marL="457200" indent="0" algn="ctr">
               <a:buNone/>
-              <a:defRPr sz="2200"/>
+              <a:defRPr sz="2000"/>
             </a:lvl2pPr>
             <a:lvl3pPr marL="914400" indent="0" algn="ctr">
               <a:buNone/>
-              <a:defRPr sz="2200"/>
+              <a:defRPr sz="1800"/>
             </a:lvl3pPr>
             <a:lvl4pPr marL="1371600" indent="0" algn="ctr">
               <a:buNone/>
-              <a:defRPr sz="2000"/>
+              <a:defRPr sz="1600"/>
             </a:lvl4pPr>
             <a:lvl5pPr marL="1828800" indent="0" algn="ctr">
               <a:buNone/>
-              <a:defRPr sz="2000"/>
+              <a:defRPr sz="1600"/>
             </a:lvl5pPr>
             <a:lvl6pPr marL="2286000" indent="0" algn="ctr">
               <a:buNone/>
-              <a:defRPr sz="2000"/>
+              <a:defRPr sz="1600"/>
             </a:lvl6pPr>
             <a:lvl7pPr marL="2743200" indent="0" algn="ctr">
               <a:buNone/>
-              <a:defRPr sz="2000"/>
+              <a:defRPr sz="1600"/>
             </a:lvl7pPr>
             <a:lvl8pPr marL="3200400" indent="0" algn="ctr">
               <a:buNone/>
-              <a:defRPr sz="2000"/>
+              <a:defRPr sz="1600"/>
             </a:lvl8pPr>
             <a:lvl9pPr marL="3657600" indent="0" algn="ctr">
               <a:buNone/>
-              <a:defRPr sz="2000"/>
+              <a:defRPr sz="1600"/>
             </a:lvl9pPr>
           </a:lstStyle>
           <a:p>
@@ -281,13 +236,19 @@
               <a:rPr lang="en-US"/>
               <a:t>Click to edit Master subtitle style</a:t>
             </a:r>
-            <a:endParaRPr lang="en-US" dirty="0"/>
-          </a:p>
-        </p:txBody>
-      </p:sp>
-      <p:sp>
-        <p:nvSpPr>
-          <p:cNvPr id="4" name="Date Placeholder 3"/>
+            <a:endParaRPr lang="en-GB"/>
+          </a:p>
+        </p:txBody>
+      </p:sp>
+      <p:sp>
+        <p:nvSpPr>
+          <p:cNvPr id="4" name="Date Placeholder 3">
+            <a:extLst>
+              <a:ext uri="{FF2B5EF4-FFF2-40B4-BE49-F238E27FC236}">
+                <a16:creationId xmlns:a16="http://schemas.microsoft.com/office/drawing/2014/main" id="{EF8E581C-A03F-A203-1B1F-0E42AE47EFEE}"/>
+              </a:ext>
+            </a:extLst>
+          </p:cNvPr>
           <p:cNvSpPr>
             <a:spLocks noGrp="1"/>
           </p:cNvSpPr>
@@ -298,19 +259,11 @@
         <p:spPr/>
         <p:txBody>
           <a:bodyPr/>
-          <a:lstStyle>
-            <a:lvl1pPr>
-              <a:defRPr>
-                <a:solidFill>
-                  <a:srgbClr val="FFFFFF"/>
-                </a:solidFill>
-              </a:defRPr>
-            </a:lvl1pPr>
-          </a:lstStyle>
+          <a:lstStyle/>
           <a:p>
             <a:fld id="{C2EF7422-D2C7-40BE-B8B2-27F6F564B2F4}" type="datetimeFigureOut">
               <a:rPr lang="en-GB" smtClean="0"/>
-              <a:t>23/10/2023</a:t>
+              <a:t>29/10/2023</a:t>
             </a:fld>
             <a:endParaRPr lang="en-GB"/>
           </a:p>
@@ -318,7 +271,13 @@
       </p:sp>
       <p:sp>
         <p:nvSpPr>
-          <p:cNvPr id="5" name="Footer Placeholder 4"/>
+          <p:cNvPr id="5" name="Footer Placeholder 4">
+            <a:extLst>
+              <a:ext uri="{FF2B5EF4-FFF2-40B4-BE49-F238E27FC236}">
+                <a16:creationId xmlns:a16="http://schemas.microsoft.com/office/drawing/2014/main" id="{4486ECD4-7F0E-5495-DBE9-4920D3EF2582}"/>
+              </a:ext>
+            </a:extLst>
+          </p:cNvPr>
           <p:cNvSpPr>
             <a:spLocks noGrp="1"/>
           </p:cNvSpPr>
@@ -329,23 +288,21 @@
         <p:spPr/>
         <p:txBody>
           <a:bodyPr/>
-          <a:lstStyle>
-            <a:lvl1pPr>
-              <a:defRPr>
-                <a:solidFill>
-                  <a:srgbClr val="FFFFFF"/>
-                </a:solidFill>
-              </a:defRPr>
-            </a:lvl1pPr>
-          </a:lstStyle>
-          <a:p>
-            <a:endParaRPr lang="en-GB"/>
-          </a:p>
-        </p:txBody>
-      </p:sp>
-      <p:sp>
-        <p:nvSpPr>
-          <p:cNvPr id="6" name="Slide Number Placeholder 5"/>
+          <a:lstStyle/>
+          <a:p>
+            <a:endParaRPr lang="en-GB"/>
+          </a:p>
+        </p:txBody>
+      </p:sp>
+      <p:sp>
+        <p:nvSpPr>
+          <p:cNvPr id="6" name="Slide Number Placeholder 5">
+            <a:extLst>
+              <a:ext uri="{FF2B5EF4-FFF2-40B4-BE49-F238E27FC236}">
+                <a16:creationId xmlns:a16="http://schemas.microsoft.com/office/drawing/2014/main" id="{9D278031-8234-C149-0B8F-E78860374F94}"/>
+              </a:ext>
+            </a:extLst>
+          </p:cNvPr>
           <p:cNvSpPr>
             <a:spLocks noGrp="1"/>
           </p:cNvSpPr>
@@ -356,15 +313,7 @@
         <p:spPr/>
         <p:txBody>
           <a:bodyPr/>
-          <a:lstStyle>
-            <a:lvl1pPr>
-              <a:defRPr>
-                <a:solidFill>
-                  <a:srgbClr val="FFFFFF"/>
-                </a:solidFill>
-              </a:defRPr>
-            </a:lvl1pPr>
-          </a:lstStyle>
+          <a:lstStyle/>
           <a:p>
             <a:fld id="{19099475-A2CC-404E-8DE5-7596E8B4AE6C}" type="slidenum">
               <a:rPr lang="en-GB" smtClean="0"/>
@@ -374,45 +323,10 @@
           </a:p>
         </p:txBody>
       </p:sp>
-      <p:cxnSp>
-        <p:nvCxnSpPr>
-          <p:cNvPr id="8" name="Straight Connector 7"/>
-          <p:cNvCxnSpPr/>
-          <p:nvPr/>
-        </p:nvCxnSpPr>
-        <p:spPr>
-          <a:xfrm>
-            <a:off x="1978660" y="3733800"/>
-            <a:ext cx="8229601" cy="0"/>
-          </a:xfrm>
-          <a:prstGeom prst="line">
-            <a:avLst/>
-          </a:prstGeom>
-          <a:ln>
-            <a:solidFill>
-              <a:srgbClr val="FFFFFF"/>
-            </a:solidFill>
-          </a:ln>
-        </p:spPr>
-        <p:style>
-          <a:lnRef idx="1">
-            <a:schemeClr val="accent1"/>
-          </a:lnRef>
-          <a:fillRef idx="0">
-            <a:schemeClr val="accent1"/>
-          </a:fillRef>
-          <a:effectRef idx="0">
-            <a:schemeClr val="accent1"/>
-          </a:effectRef>
-          <a:fontRef idx="minor">
-            <a:schemeClr val="tx1"/>
-          </a:fontRef>
-        </p:style>
-      </p:cxnSp>
     </p:spTree>
     <p:extLst>
       <p:ext uri="{BB962C8B-B14F-4D97-AF65-F5344CB8AC3E}">
-        <p14:creationId xmlns:p14="http://schemas.microsoft.com/office/powerpoint/2010/main" val="288390987"/>
+        <p14:creationId xmlns:p14="http://schemas.microsoft.com/office/powerpoint/2010/main" val="2669447050"/>
       </p:ext>
     </p:extLst>
   </p:cSld>
@@ -441,7 +355,13 @@
       </p:grpSpPr>
       <p:sp>
         <p:nvSpPr>
-          <p:cNvPr id="2" name="Title 1"/>
+          <p:cNvPr id="2" name="Title 1">
+            <a:extLst>
+              <a:ext uri="{FF2B5EF4-FFF2-40B4-BE49-F238E27FC236}">
+                <a16:creationId xmlns:a16="http://schemas.microsoft.com/office/drawing/2014/main" id="{484C987C-AB65-7A4D-86D1-BCAD3DDDAE4C}"/>
+              </a:ext>
+            </a:extLst>
+          </p:cNvPr>
           <p:cNvSpPr>
             <a:spLocks noGrp="1"/>
           </p:cNvSpPr>
@@ -458,13 +378,19 @@
               <a:rPr lang="en-US"/>
               <a:t>Click to edit Master title style</a:t>
             </a:r>
-            <a:endParaRPr lang="en-US" dirty="0"/>
-          </a:p>
-        </p:txBody>
-      </p:sp>
-      <p:sp>
-        <p:nvSpPr>
-          <p:cNvPr id="3" name="Vertical Text Placeholder 2"/>
+            <a:endParaRPr lang="en-GB"/>
+          </a:p>
+        </p:txBody>
+      </p:sp>
+      <p:sp>
+        <p:nvSpPr>
+          <p:cNvPr id="3" name="Vertical Text Placeholder 2">
+            <a:extLst>
+              <a:ext uri="{FF2B5EF4-FFF2-40B4-BE49-F238E27FC236}">
+                <a16:creationId xmlns:a16="http://schemas.microsoft.com/office/drawing/2014/main" id="{74A03969-A5DD-D9FE-C9AE-36283D443BFE}"/>
+              </a:ext>
+            </a:extLst>
+          </p:cNvPr>
           <p:cNvSpPr>
             <a:spLocks noGrp="1"/>
           </p:cNvSpPr>
@@ -510,13 +436,19 @@
               <a:rPr lang="en-US"/>
               <a:t>Fifth level</a:t>
             </a:r>
-            <a:endParaRPr lang="en-US" dirty="0"/>
-          </a:p>
-        </p:txBody>
-      </p:sp>
-      <p:sp>
-        <p:nvSpPr>
-          <p:cNvPr id="4" name="Date Placeholder 3"/>
+            <a:endParaRPr lang="en-GB"/>
+          </a:p>
+        </p:txBody>
+      </p:sp>
+      <p:sp>
+        <p:nvSpPr>
+          <p:cNvPr id="4" name="Date Placeholder 3">
+            <a:extLst>
+              <a:ext uri="{FF2B5EF4-FFF2-40B4-BE49-F238E27FC236}">
+                <a16:creationId xmlns:a16="http://schemas.microsoft.com/office/drawing/2014/main" id="{AFE36BA0-004A-2369-B74B-EFB9BA5619EF}"/>
+              </a:ext>
+            </a:extLst>
+          </p:cNvPr>
           <p:cNvSpPr>
             <a:spLocks noGrp="1"/>
           </p:cNvSpPr>
@@ -531,7 +463,7 @@
           <a:p>
             <a:fld id="{C2EF7422-D2C7-40BE-B8B2-27F6F564B2F4}" type="datetimeFigureOut">
               <a:rPr lang="en-GB" smtClean="0"/>
-              <a:t>23/10/2023</a:t>
+              <a:t>29/10/2023</a:t>
             </a:fld>
             <a:endParaRPr lang="en-GB"/>
           </a:p>
@@ -539,7 +471,13 @@
       </p:sp>
       <p:sp>
         <p:nvSpPr>
-          <p:cNvPr id="5" name="Footer Placeholder 4"/>
+          <p:cNvPr id="5" name="Footer Placeholder 4">
+            <a:extLst>
+              <a:ext uri="{FF2B5EF4-FFF2-40B4-BE49-F238E27FC236}">
+                <a16:creationId xmlns:a16="http://schemas.microsoft.com/office/drawing/2014/main" id="{D1BA2616-3ED6-69A5-B2AB-F9D8638E3FA4}"/>
+              </a:ext>
+            </a:extLst>
+          </p:cNvPr>
           <p:cNvSpPr>
             <a:spLocks noGrp="1"/>
           </p:cNvSpPr>
@@ -558,7 +496,13 @@
       </p:sp>
       <p:sp>
         <p:nvSpPr>
-          <p:cNvPr id="6" name="Slide Number Placeholder 5"/>
+          <p:cNvPr id="6" name="Slide Number Placeholder 5">
+            <a:extLst>
+              <a:ext uri="{FF2B5EF4-FFF2-40B4-BE49-F238E27FC236}">
+                <a16:creationId xmlns:a16="http://schemas.microsoft.com/office/drawing/2014/main" id="{AAB28471-42C5-ACE9-2122-AC119A30F9E3}"/>
+              </a:ext>
+            </a:extLst>
+          </p:cNvPr>
           <p:cNvSpPr>
             <a:spLocks noGrp="1"/>
           </p:cNvSpPr>
@@ -582,7 +526,7 @@
     </p:spTree>
     <p:extLst>
       <p:ext uri="{BB962C8B-B14F-4D97-AF65-F5344CB8AC3E}">
-        <p14:creationId xmlns:p14="http://schemas.microsoft.com/office/powerpoint/2010/main" val="950460857"/>
+        <p14:creationId xmlns:p14="http://schemas.microsoft.com/office/powerpoint/2010/main" val="4225741524"/>
       </p:ext>
     </p:extLst>
   </p:cSld>
@@ -611,7 +555,13 @@
       </p:grpSpPr>
       <p:sp>
         <p:nvSpPr>
-          <p:cNvPr id="2" name="Vertical Title 1"/>
+          <p:cNvPr id="2" name="Vertical Title 1">
+            <a:extLst>
+              <a:ext uri="{FF2B5EF4-FFF2-40B4-BE49-F238E27FC236}">
+                <a16:creationId xmlns:a16="http://schemas.microsoft.com/office/drawing/2014/main" id="{DDFD1789-82C2-758C-0C20-CFAC1CF13394}"/>
+              </a:ext>
+            </a:extLst>
+          </p:cNvPr>
           <p:cNvSpPr>
             <a:spLocks noGrp="1"/>
           </p:cNvSpPr>
@@ -621,8 +571,8 @@
         </p:nvSpPr>
         <p:spPr>
           <a:xfrm>
-            <a:off x="8724900" y="762000"/>
-            <a:ext cx="2324100" cy="5410200"/>
+            <a:off x="8724900" y="365125"/>
+            <a:ext cx="2628900" cy="5811838"/>
           </a:xfrm>
         </p:spPr>
         <p:txBody>
@@ -633,13 +583,19 @@
               <a:rPr lang="en-US"/>
               <a:t>Click to edit Master title style</a:t>
             </a:r>
-            <a:endParaRPr lang="en-US" dirty="0"/>
-          </a:p>
-        </p:txBody>
-      </p:sp>
-      <p:sp>
-        <p:nvSpPr>
-          <p:cNvPr id="3" name="Vertical Text Placeholder 2"/>
+            <a:endParaRPr lang="en-GB"/>
+          </a:p>
+        </p:txBody>
+      </p:sp>
+      <p:sp>
+        <p:nvSpPr>
+          <p:cNvPr id="3" name="Vertical Text Placeholder 2">
+            <a:extLst>
+              <a:ext uri="{FF2B5EF4-FFF2-40B4-BE49-F238E27FC236}">
+                <a16:creationId xmlns:a16="http://schemas.microsoft.com/office/drawing/2014/main" id="{B479F9AB-A47A-16F4-58A6-611FE3244CD9}"/>
+              </a:ext>
+            </a:extLst>
+          </p:cNvPr>
           <p:cNvSpPr>
             <a:spLocks noGrp="1"/>
           </p:cNvSpPr>
@@ -649,8 +605,8 @@
         </p:nvSpPr>
         <p:spPr>
           <a:xfrm>
-            <a:off x="1143000" y="762000"/>
-            <a:ext cx="7429500" cy="5410200"/>
+            <a:off x="838200" y="365125"/>
+            <a:ext cx="7734300" cy="5811838"/>
           </a:xfrm>
         </p:spPr>
         <p:txBody>
@@ -690,13 +646,19 @@
               <a:rPr lang="en-US"/>
               <a:t>Fifth level</a:t>
             </a:r>
-            <a:endParaRPr lang="en-US" dirty="0"/>
-          </a:p>
-        </p:txBody>
-      </p:sp>
-      <p:sp>
-        <p:nvSpPr>
-          <p:cNvPr id="4" name="Date Placeholder 3"/>
+            <a:endParaRPr lang="en-GB"/>
+          </a:p>
+        </p:txBody>
+      </p:sp>
+      <p:sp>
+        <p:nvSpPr>
+          <p:cNvPr id="4" name="Date Placeholder 3">
+            <a:extLst>
+              <a:ext uri="{FF2B5EF4-FFF2-40B4-BE49-F238E27FC236}">
+                <a16:creationId xmlns:a16="http://schemas.microsoft.com/office/drawing/2014/main" id="{63B57780-A447-D14E-BB9B-1F6D5C7719CC}"/>
+              </a:ext>
+            </a:extLst>
+          </p:cNvPr>
           <p:cNvSpPr>
             <a:spLocks noGrp="1"/>
           </p:cNvSpPr>
@@ -711,7 +673,7 @@
           <a:p>
             <a:fld id="{C2EF7422-D2C7-40BE-B8B2-27F6F564B2F4}" type="datetimeFigureOut">
               <a:rPr lang="en-GB" smtClean="0"/>
-              <a:t>23/10/2023</a:t>
+              <a:t>29/10/2023</a:t>
             </a:fld>
             <a:endParaRPr lang="en-GB"/>
           </a:p>
@@ -719,7 +681,13 @@
       </p:sp>
       <p:sp>
         <p:nvSpPr>
-          <p:cNvPr id="5" name="Footer Placeholder 4"/>
+          <p:cNvPr id="5" name="Footer Placeholder 4">
+            <a:extLst>
+              <a:ext uri="{FF2B5EF4-FFF2-40B4-BE49-F238E27FC236}">
+                <a16:creationId xmlns:a16="http://schemas.microsoft.com/office/drawing/2014/main" id="{416BD051-E5C5-CBBA-D829-D652FF43AAA6}"/>
+              </a:ext>
+            </a:extLst>
+          </p:cNvPr>
           <p:cNvSpPr>
             <a:spLocks noGrp="1"/>
           </p:cNvSpPr>
@@ -738,7 +706,13 @@
       </p:sp>
       <p:sp>
         <p:nvSpPr>
-          <p:cNvPr id="6" name="Slide Number Placeholder 5"/>
+          <p:cNvPr id="6" name="Slide Number Placeholder 5">
+            <a:extLst>
+              <a:ext uri="{FF2B5EF4-FFF2-40B4-BE49-F238E27FC236}">
+                <a16:creationId xmlns:a16="http://schemas.microsoft.com/office/drawing/2014/main" id="{DAFA545E-6E23-1015-4823-CF41AA7B55F6}"/>
+              </a:ext>
+            </a:extLst>
+          </p:cNvPr>
           <p:cNvSpPr>
             <a:spLocks noGrp="1"/>
           </p:cNvSpPr>
@@ -762,7 +736,7 @@
     </p:spTree>
     <p:extLst>
       <p:ext uri="{BB962C8B-B14F-4D97-AF65-F5344CB8AC3E}">
-        <p14:creationId xmlns:p14="http://schemas.microsoft.com/office/powerpoint/2010/main" val="1386331944"/>
+        <p14:creationId xmlns:p14="http://schemas.microsoft.com/office/powerpoint/2010/main" val="3670957189"/>
       </p:ext>
     </p:extLst>
   </p:cSld>
@@ -791,7 +765,13 @@
       </p:grpSpPr>
       <p:sp>
         <p:nvSpPr>
-          <p:cNvPr id="2" name="Title 1"/>
+          <p:cNvPr id="2" name="Title 1">
+            <a:extLst>
+              <a:ext uri="{FF2B5EF4-FFF2-40B4-BE49-F238E27FC236}">
+                <a16:creationId xmlns:a16="http://schemas.microsoft.com/office/drawing/2014/main" id="{75A44CB5-34AC-93D3-3AD0-CD683C46D76D}"/>
+              </a:ext>
+            </a:extLst>
+          </p:cNvPr>
           <p:cNvSpPr>
             <a:spLocks noGrp="1"/>
           </p:cNvSpPr>
@@ -808,13 +788,19 @@
               <a:rPr lang="en-US"/>
               <a:t>Click to edit Master title style</a:t>
             </a:r>
-            <a:endParaRPr lang="en-US" dirty="0"/>
-          </a:p>
-        </p:txBody>
-      </p:sp>
-      <p:sp>
-        <p:nvSpPr>
-          <p:cNvPr id="3" name="Content Placeholder 2"/>
+            <a:endParaRPr lang="en-GB"/>
+          </a:p>
+        </p:txBody>
+      </p:sp>
+      <p:sp>
+        <p:nvSpPr>
+          <p:cNvPr id="3" name="Content Placeholder 2">
+            <a:extLst>
+              <a:ext uri="{FF2B5EF4-FFF2-40B4-BE49-F238E27FC236}">
+                <a16:creationId xmlns:a16="http://schemas.microsoft.com/office/drawing/2014/main" id="{F33B980F-97C2-0133-7FD3-10D250567816}"/>
+              </a:ext>
+            </a:extLst>
+          </p:cNvPr>
           <p:cNvSpPr>
             <a:spLocks noGrp="1"/>
           </p:cNvSpPr>
@@ -860,13 +846,19 @@
               <a:rPr lang="en-US"/>
               <a:t>Fifth level</a:t>
             </a:r>
-            <a:endParaRPr lang="en-US" dirty="0"/>
-          </a:p>
-        </p:txBody>
-      </p:sp>
-      <p:sp>
-        <p:nvSpPr>
-          <p:cNvPr id="4" name="Date Placeholder 3"/>
+            <a:endParaRPr lang="en-GB"/>
+          </a:p>
+        </p:txBody>
+      </p:sp>
+      <p:sp>
+        <p:nvSpPr>
+          <p:cNvPr id="4" name="Date Placeholder 3">
+            <a:extLst>
+              <a:ext uri="{FF2B5EF4-FFF2-40B4-BE49-F238E27FC236}">
+                <a16:creationId xmlns:a16="http://schemas.microsoft.com/office/drawing/2014/main" id="{2EDDCFA7-CBA2-4A3E-B1B6-19A293F4298A}"/>
+              </a:ext>
+            </a:extLst>
+          </p:cNvPr>
           <p:cNvSpPr>
             <a:spLocks noGrp="1"/>
           </p:cNvSpPr>
@@ -881,7 +873,7 @@
           <a:p>
             <a:fld id="{C2EF7422-D2C7-40BE-B8B2-27F6F564B2F4}" type="datetimeFigureOut">
               <a:rPr lang="en-GB" smtClean="0"/>
-              <a:t>23/10/2023</a:t>
+              <a:t>29/10/2023</a:t>
             </a:fld>
             <a:endParaRPr lang="en-GB"/>
           </a:p>
@@ -889,7 +881,13 @@
       </p:sp>
       <p:sp>
         <p:nvSpPr>
-          <p:cNvPr id="5" name="Footer Placeholder 4"/>
+          <p:cNvPr id="5" name="Footer Placeholder 4">
+            <a:extLst>
+              <a:ext uri="{FF2B5EF4-FFF2-40B4-BE49-F238E27FC236}">
+                <a16:creationId xmlns:a16="http://schemas.microsoft.com/office/drawing/2014/main" id="{FFC1D413-EA3C-BB3D-612C-C6BDAF62DA37}"/>
+              </a:ext>
+            </a:extLst>
+          </p:cNvPr>
           <p:cNvSpPr>
             <a:spLocks noGrp="1"/>
           </p:cNvSpPr>
@@ -908,7 +906,13 @@
       </p:sp>
       <p:sp>
         <p:nvSpPr>
-          <p:cNvPr id="6" name="Slide Number Placeholder 5"/>
+          <p:cNvPr id="6" name="Slide Number Placeholder 5">
+            <a:extLst>
+              <a:ext uri="{FF2B5EF4-FFF2-40B4-BE49-F238E27FC236}">
+                <a16:creationId xmlns:a16="http://schemas.microsoft.com/office/drawing/2014/main" id="{1F22B5E7-4136-007F-1A5E-7A87227C2428}"/>
+              </a:ext>
+            </a:extLst>
+          </p:cNvPr>
           <p:cNvSpPr>
             <a:spLocks noGrp="1"/>
           </p:cNvSpPr>
@@ -932,7 +936,7 @@
     </p:spTree>
     <p:extLst>
       <p:ext uri="{BB962C8B-B14F-4D97-AF65-F5344CB8AC3E}">
-        <p14:creationId xmlns:p14="http://schemas.microsoft.com/office/powerpoint/2010/main" val="431277439"/>
+        <p14:creationId xmlns:p14="http://schemas.microsoft.com/office/powerpoint/2010/main" val="2954386541"/>
       </p:ext>
     </p:extLst>
   </p:cSld>
@@ -961,7 +965,13 @@
       </p:grpSpPr>
       <p:sp>
         <p:nvSpPr>
-          <p:cNvPr id="2" name="Title 1"/>
+          <p:cNvPr id="2" name="Title 1">
+            <a:extLst>
+              <a:ext uri="{FF2B5EF4-FFF2-40B4-BE49-F238E27FC236}">
+                <a16:creationId xmlns:a16="http://schemas.microsoft.com/office/drawing/2014/main" id="{9DE88122-6F89-C3E1-A499-0ADEC3F7AF15}"/>
+              </a:ext>
+            </a:extLst>
+          </p:cNvPr>
           <p:cNvSpPr>
             <a:spLocks noGrp="1"/>
           </p:cNvSpPr>
@@ -971,20 +981,15 @@
         </p:nvSpPr>
         <p:spPr>
           <a:xfrm>
-            <a:off x="1106424" y="1173575"/>
-            <a:ext cx="9966960" cy="2926080"/>
+            <a:off x="831850" y="1709738"/>
+            <a:ext cx="10515600" cy="2852737"/>
           </a:xfrm>
         </p:spPr>
         <p:txBody>
-          <a:bodyPr anchor="b">
-            <a:noAutofit/>
-          </a:bodyPr>
+          <a:bodyPr anchor="b"/>
           <a:lstStyle>
-            <a:lvl1pPr algn="ctr">
-              <a:lnSpc>
-                <a:spcPct val="85000"/>
-              </a:lnSpc>
-              <a:defRPr sz="7200" b="0" cap="all" baseline="0"/>
+            <a:lvl1pPr>
+              <a:defRPr sz="6000"/>
             </a:lvl1pPr>
           </a:lstStyle>
           <a:p>
@@ -992,13 +997,19 @@
               <a:rPr lang="en-US"/>
               <a:t>Click to edit Master title style</a:t>
             </a:r>
-            <a:endParaRPr lang="en-US" dirty="0"/>
-          </a:p>
-        </p:txBody>
-      </p:sp>
-      <p:sp>
-        <p:nvSpPr>
-          <p:cNvPr id="3" name="Text Placeholder 2"/>
+            <a:endParaRPr lang="en-GB"/>
+          </a:p>
+        </p:txBody>
+      </p:sp>
+      <p:sp>
+        <p:nvSpPr>
+          <p:cNvPr id="3" name="Text Placeholder 2">
+            <a:extLst>
+              <a:ext uri="{FF2B5EF4-FFF2-40B4-BE49-F238E27FC236}">
+                <a16:creationId xmlns:a16="http://schemas.microsoft.com/office/drawing/2014/main" id="{8FB3D5EB-F0EB-F5FA-C058-F6D8DAF4E090}"/>
+              </a:ext>
+            </a:extLst>
+          </p:cNvPr>
           <p:cNvSpPr>
             <a:spLocks noGrp="1"/>
           </p:cNvSpPr>
@@ -1008,26 +1019,26 @@
         </p:nvSpPr>
         <p:spPr>
           <a:xfrm>
-            <a:off x="1709928" y="4154520"/>
-            <a:ext cx="8769096" cy="1363806"/>
+            <a:off x="831850" y="4589463"/>
+            <a:ext cx="10515600" cy="1500187"/>
           </a:xfrm>
         </p:spPr>
         <p:txBody>
-          <a:bodyPr anchor="t">
-            <a:normAutofit/>
-          </a:bodyPr>
+          <a:bodyPr/>
           <a:lstStyle>
-            <a:lvl1pPr marL="0" indent="0" algn="ctr">
-              <a:buNone/>
-              <a:defRPr sz="2200">
+            <a:lvl1pPr marL="0" indent="0">
+              <a:buNone/>
+              <a:defRPr sz="2400">
                 <a:solidFill>
-                  <a:schemeClr val="accent1"/>
+                  <a:schemeClr val="tx1">
+                    <a:tint val="75000"/>
+                  </a:schemeClr>
                 </a:solidFill>
               </a:defRPr>
             </a:lvl1pPr>
             <a:lvl2pPr marL="457200" indent="0">
               <a:buNone/>
-              <a:defRPr sz="1800">
+              <a:defRPr sz="2000">
                 <a:solidFill>
                   <a:schemeClr val="tx1">
                     <a:tint val="75000"/>
@@ -1037,7 +1048,7 @@
             </a:lvl2pPr>
             <a:lvl3pPr marL="914400" indent="0">
               <a:buNone/>
-              <a:defRPr sz="1600">
+              <a:defRPr sz="1800">
                 <a:solidFill>
                   <a:schemeClr val="tx1">
                     <a:tint val="75000"/>
@@ -1047,7 +1058,7 @@
             </a:lvl3pPr>
             <a:lvl4pPr marL="1371600" indent="0">
               <a:buNone/>
-              <a:defRPr sz="1400">
+              <a:defRPr sz="1600">
                 <a:solidFill>
                   <a:schemeClr val="tx1">
                     <a:tint val="75000"/>
@@ -1057,7 +1068,7 @@
             </a:lvl4pPr>
             <a:lvl5pPr marL="1828800" indent="0">
               <a:buNone/>
-              <a:defRPr sz="1400">
+              <a:defRPr sz="1600">
                 <a:solidFill>
                   <a:schemeClr val="tx1">
                     <a:tint val="75000"/>
@@ -1067,7 +1078,7 @@
             </a:lvl5pPr>
             <a:lvl6pPr marL="2286000" indent="0">
               <a:buNone/>
-              <a:defRPr sz="1400">
+              <a:defRPr sz="1600">
                 <a:solidFill>
                   <a:schemeClr val="tx1">
                     <a:tint val="75000"/>
@@ -1077,7 +1088,7 @@
             </a:lvl6pPr>
             <a:lvl7pPr marL="2743200" indent="0">
               <a:buNone/>
-              <a:defRPr sz="1400">
+              <a:defRPr sz="1600">
                 <a:solidFill>
                   <a:schemeClr val="tx1">
                     <a:tint val="75000"/>
@@ -1087,7 +1098,7 @@
             </a:lvl7pPr>
             <a:lvl8pPr marL="3200400" indent="0">
               <a:buNone/>
-              <a:defRPr sz="1400">
+              <a:defRPr sz="1600">
                 <a:solidFill>
                   <a:schemeClr val="tx1">
                     <a:tint val="75000"/>
@@ -1097,7 +1108,7 @@
             </a:lvl8pPr>
             <a:lvl9pPr marL="3657600" indent="0">
               <a:buNone/>
-              <a:defRPr sz="1400">
+              <a:defRPr sz="1600">
                 <a:solidFill>
                   <a:schemeClr val="tx1">
                     <a:tint val="75000"/>
@@ -1117,7 +1128,13 @@
       </p:sp>
       <p:sp>
         <p:nvSpPr>
-          <p:cNvPr id="4" name="Date Placeholder 3"/>
+          <p:cNvPr id="4" name="Date Placeholder 3">
+            <a:extLst>
+              <a:ext uri="{FF2B5EF4-FFF2-40B4-BE49-F238E27FC236}">
+                <a16:creationId xmlns:a16="http://schemas.microsoft.com/office/drawing/2014/main" id="{B5E17E6A-0714-A68C-2959-FE35B59B10A4}"/>
+              </a:ext>
+            </a:extLst>
+          </p:cNvPr>
           <p:cNvSpPr>
             <a:spLocks noGrp="1"/>
           </p:cNvSpPr>
@@ -1132,7 +1149,7 @@
           <a:p>
             <a:fld id="{C2EF7422-D2C7-40BE-B8B2-27F6F564B2F4}" type="datetimeFigureOut">
               <a:rPr lang="en-GB" smtClean="0"/>
-              <a:t>23/10/2023</a:t>
+              <a:t>29/10/2023</a:t>
             </a:fld>
             <a:endParaRPr lang="en-GB"/>
           </a:p>
@@ -1140,7 +1157,13 @@
       </p:sp>
       <p:sp>
         <p:nvSpPr>
-          <p:cNvPr id="5" name="Footer Placeholder 4"/>
+          <p:cNvPr id="5" name="Footer Placeholder 4">
+            <a:extLst>
+              <a:ext uri="{FF2B5EF4-FFF2-40B4-BE49-F238E27FC236}">
+                <a16:creationId xmlns:a16="http://schemas.microsoft.com/office/drawing/2014/main" id="{843DE880-1AF3-2019-2016-6B416D058F87}"/>
+              </a:ext>
+            </a:extLst>
+          </p:cNvPr>
           <p:cNvSpPr>
             <a:spLocks noGrp="1"/>
           </p:cNvSpPr>
@@ -1159,7 +1182,13 @@
       </p:sp>
       <p:sp>
         <p:nvSpPr>
-          <p:cNvPr id="6" name="Slide Number Placeholder 5"/>
+          <p:cNvPr id="6" name="Slide Number Placeholder 5">
+            <a:extLst>
+              <a:ext uri="{FF2B5EF4-FFF2-40B4-BE49-F238E27FC236}">
+                <a16:creationId xmlns:a16="http://schemas.microsoft.com/office/drawing/2014/main" id="{04C18143-D7A2-848D-DBAF-F48FBE82E146}"/>
+              </a:ext>
+            </a:extLst>
+          </p:cNvPr>
           <p:cNvSpPr>
             <a:spLocks noGrp="1"/>
           </p:cNvSpPr>
@@ -1180,45 +1209,10 @@
           </a:p>
         </p:txBody>
       </p:sp>
-      <p:cxnSp>
-        <p:nvCxnSpPr>
-          <p:cNvPr id="7" name="Straight Connector 6"/>
-          <p:cNvCxnSpPr/>
-          <p:nvPr/>
-        </p:nvCxnSpPr>
-        <p:spPr>
-          <a:xfrm>
-            <a:off x="1981200" y="4020408"/>
-            <a:ext cx="8229601" cy="0"/>
-          </a:xfrm>
-          <a:prstGeom prst="line">
-            <a:avLst/>
-          </a:prstGeom>
-          <a:ln>
-            <a:solidFill>
-              <a:schemeClr val="accent1"/>
-            </a:solidFill>
-          </a:ln>
-        </p:spPr>
-        <p:style>
-          <a:lnRef idx="1">
-            <a:schemeClr val="accent1"/>
-          </a:lnRef>
-          <a:fillRef idx="0">
-            <a:schemeClr val="accent1"/>
-          </a:fillRef>
-          <a:effectRef idx="0">
-            <a:schemeClr val="accent1"/>
-          </a:effectRef>
-          <a:fontRef idx="minor">
-            <a:schemeClr val="tx1"/>
-          </a:fontRef>
-        </p:style>
-      </p:cxnSp>
     </p:spTree>
     <p:extLst>
       <p:ext uri="{BB962C8B-B14F-4D97-AF65-F5344CB8AC3E}">
-        <p14:creationId xmlns:p14="http://schemas.microsoft.com/office/powerpoint/2010/main" val="379891254"/>
+        <p14:creationId xmlns:p14="http://schemas.microsoft.com/office/powerpoint/2010/main" val="1215275671"/>
       </p:ext>
     </p:extLst>
   </p:cSld>
@@ -1247,7 +1241,13 @@
       </p:grpSpPr>
       <p:sp>
         <p:nvSpPr>
-          <p:cNvPr id="8" name="Title 7"/>
+          <p:cNvPr id="2" name="Title 1">
+            <a:extLst>
+              <a:ext uri="{FF2B5EF4-FFF2-40B4-BE49-F238E27FC236}">
+                <a16:creationId xmlns:a16="http://schemas.microsoft.com/office/drawing/2014/main" id="{0A253207-F9A2-3C76-7A2C-E192F33A30EA}"/>
+              </a:ext>
+            </a:extLst>
+          </p:cNvPr>
           <p:cNvSpPr>
             <a:spLocks noGrp="1"/>
           </p:cNvSpPr>
@@ -1264,13 +1264,19 @@
               <a:rPr lang="en-US"/>
               <a:t>Click to edit Master title style</a:t>
             </a:r>
-            <a:endParaRPr lang="en-US" dirty="0"/>
-          </a:p>
-        </p:txBody>
-      </p:sp>
-      <p:sp>
-        <p:nvSpPr>
-          <p:cNvPr id="3" name="Content Placeholder 2"/>
+            <a:endParaRPr lang="en-GB"/>
+          </a:p>
+        </p:txBody>
+      </p:sp>
+      <p:sp>
+        <p:nvSpPr>
+          <p:cNvPr id="3" name="Content Placeholder 2">
+            <a:extLst>
+              <a:ext uri="{FF2B5EF4-FFF2-40B4-BE49-F238E27FC236}">
+                <a16:creationId xmlns:a16="http://schemas.microsoft.com/office/drawing/2014/main" id="{A2E0CD9C-8ADD-F5CD-B6C8-3D2CF8605BE8}"/>
+              </a:ext>
+            </a:extLst>
+          </p:cNvPr>
           <p:cNvSpPr>
             <a:spLocks noGrp="1"/>
           </p:cNvSpPr>
@@ -1280,41 +1286,13 @@
         </p:nvSpPr>
         <p:spPr>
           <a:xfrm>
-            <a:off x="1143000" y="2057399"/>
-            <a:ext cx="4754880" cy="4023360"/>
+            <a:off x="838200" y="1825625"/>
+            <a:ext cx="5181600" cy="4351338"/>
           </a:xfrm>
         </p:spPr>
         <p:txBody>
           <a:bodyPr/>
-          <a:lstStyle>
-            <a:lvl1pPr>
-              <a:defRPr sz="2200"/>
-            </a:lvl1pPr>
-            <a:lvl2pPr>
-              <a:defRPr sz="2000"/>
-            </a:lvl2pPr>
-            <a:lvl3pPr>
-              <a:defRPr sz="1800"/>
-            </a:lvl3pPr>
-            <a:lvl4pPr>
-              <a:defRPr sz="1600"/>
-            </a:lvl4pPr>
-            <a:lvl5pPr>
-              <a:defRPr sz="1600"/>
-            </a:lvl5pPr>
-            <a:lvl6pPr>
-              <a:defRPr sz="1600"/>
-            </a:lvl6pPr>
-            <a:lvl7pPr>
-              <a:defRPr sz="1600"/>
-            </a:lvl7pPr>
-            <a:lvl8pPr>
-              <a:defRPr sz="1600"/>
-            </a:lvl8pPr>
-            <a:lvl9pPr>
-              <a:defRPr sz="1600"/>
-            </a:lvl9pPr>
-          </a:lstStyle>
+          <a:lstStyle/>
           <a:p>
             <a:pPr lvl="0"/>
             <a:r>
@@ -1349,13 +1327,19 @@
               <a:rPr lang="en-US"/>
               <a:t>Fifth level</a:t>
             </a:r>
-            <a:endParaRPr lang="en-US" dirty="0"/>
-          </a:p>
-        </p:txBody>
-      </p:sp>
-      <p:sp>
-        <p:nvSpPr>
-          <p:cNvPr id="4" name="Content Placeholder 3"/>
+            <a:endParaRPr lang="en-GB"/>
+          </a:p>
+        </p:txBody>
+      </p:sp>
+      <p:sp>
+        <p:nvSpPr>
+          <p:cNvPr id="4" name="Content Placeholder 3">
+            <a:extLst>
+              <a:ext uri="{FF2B5EF4-FFF2-40B4-BE49-F238E27FC236}">
+                <a16:creationId xmlns:a16="http://schemas.microsoft.com/office/drawing/2014/main" id="{BA300D83-D35F-189E-79FF-9C158CC48F01}"/>
+              </a:ext>
+            </a:extLst>
+          </p:cNvPr>
           <p:cNvSpPr>
             <a:spLocks noGrp="1"/>
           </p:cNvSpPr>
@@ -1365,41 +1349,13 @@
         </p:nvSpPr>
         <p:spPr>
           <a:xfrm>
-            <a:off x="6267612" y="2057400"/>
-            <a:ext cx="4754880" cy="4023360"/>
+            <a:off x="6172200" y="1825625"/>
+            <a:ext cx="5181600" cy="4351338"/>
           </a:xfrm>
         </p:spPr>
         <p:txBody>
           <a:bodyPr/>
-          <a:lstStyle>
-            <a:lvl1pPr>
-              <a:defRPr sz="2200"/>
-            </a:lvl1pPr>
-            <a:lvl2pPr>
-              <a:defRPr sz="2000"/>
-            </a:lvl2pPr>
-            <a:lvl3pPr>
-              <a:defRPr sz="1800"/>
-            </a:lvl3pPr>
-            <a:lvl4pPr>
-              <a:defRPr sz="1600"/>
-            </a:lvl4pPr>
-            <a:lvl5pPr>
-              <a:defRPr sz="1600"/>
-            </a:lvl5pPr>
-            <a:lvl6pPr>
-              <a:defRPr sz="1600"/>
-            </a:lvl6pPr>
-            <a:lvl7pPr>
-              <a:defRPr sz="1600"/>
-            </a:lvl7pPr>
-            <a:lvl8pPr>
-              <a:defRPr sz="1600"/>
-            </a:lvl8pPr>
-            <a:lvl9pPr>
-              <a:defRPr sz="1600"/>
-            </a:lvl9pPr>
-          </a:lstStyle>
+          <a:lstStyle/>
           <a:p>
             <a:pPr lvl="0"/>
             <a:r>
@@ -1434,13 +1390,19 @@
               <a:rPr lang="en-US"/>
               <a:t>Fifth level</a:t>
             </a:r>
-            <a:endParaRPr lang="en-US" dirty="0"/>
-          </a:p>
-        </p:txBody>
-      </p:sp>
-      <p:sp>
-        <p:nvSpPr>
-          <p:cNvPr id="5" name="Date Placeholder 4"/>
+            <a:endParaRPr lang="en-GB"/>
+          </a:p>
+        </p:txBody>
+      </p:sp>
+      <p:sp>
+        <p:nvSpPr>
+          <p:cNvPr id="5" name="Date Placeholder 4">
+            <a:extLst>
+              <a:ext uri="{FF2B5EF4-FFF2-40B4-BE49-F238E27FC236}">
+                <a16:creationId xmlns:a16="http://schemas.microsoft.com/office/drawing/2014/main" id="{4F82212D-AED5-BDD7-C9EB-A41E3A0A7DBB}"/>
+              </a:ext>
+            </a:extLst>
+          </p:cNvPr>
           <p:cNvSpPr>
             <a:spLocks noGrp="1"/>
           </p:cNvSpPr>
@@ -1455,7 +1417,7 @@
           <a:p>
             <a:fld id="{C2EF7422-D2C7-40BE-B8B2-27F6F564B2F4}" type="datetimeFigureOut">
               <a:rPr lang="en-GB" smtClean="0"/>
-              <a:t>23/10/2023</a:t>
+              <a:t>29/10/2023</a:t>
             </a:fld>
             <a:endParaRPr lang="en-GB"/>
           </a:p>
@@ -1463,7 +1425,13 @@
       </p:sp>
       <p:sp>
         <p:nvSpPr>
-          <p:cNvPr id="6" name="Footer Placeholder 5"/>
+          <p:cNvPr id="6" name="Footer Placeholder 5">
+            <a:extLst>
+              <a:ext uri="{FF2B5EF4-FFF2-40B4-BE49-F238E27FC236}">
+                <a16:creationId xmlns:a16="http://schemas.microsoft.com/office/drawing/2014/main" id="{FFA791DD-31A8-011A-EDAC-7BCC1BF03F6F}"/>
+              </a:ext>
+            </a:extLst>
+          </p:cNvPr>
           <p:cNvSpPr>
             <a:spLocks noGrp="1"/>
           </p:cNvSpPr>
@@ -1482,7 +1450,13 @@
       </p:sp>
       <p:sp>
         <p:nvSpPr>
-          <p:cNvPr id="7" name="Slide Number Placeholder 6"/>
+          <p:cNvPr id="7" name="Slide Number Placeholder 6">
+            <a:extLst>
+              <a:ext uri="{FF2B5EF4-FFF2-40B4-BE49-F238E27FC236}">
+                <a16:creationId xmlns:a16="http://schemas.microsoft.com/office/drawing/2014/main" id="{496EBD14-5E1A-0613-2E14-7F5F42B3F5A9}"/>
+              </a:ext>
+            </a:extLst>
+          </p:cNvPr>
           <p:cNvSpPr>
             <a:spLocks noGrp="1"/>
           </p:cNvSpPr>
@@ -1506,7 +1480,7 @@
     </p:spTree>
     <p:extLst>
       <p:ext uri="{BB962C8B-B14F-4D97-AF65-F5344CB8AC3E}">
-        <p14:creationId xmlns:p14="http://schemas.microsoft.com/office/powerpoint/2010/main" val="2755824222"/>
+        <p14:creationId xmlns:p14="http://schemas.microsoft.com/office/powerpoint/2010/main" val="1486015487"/>
       </p:ext>
     </p:extLst>
   </p:cSld>
@@ -1535,50 +1509,64 @@
       </p:grpSpPr>
       <p:sp>
         <p:nvSpPr>
-          <p:cNvPr id="10" name="Title 9"/>
+          <p:cNvPr id="2" name="Title 1">
+            <a:extLst>
+              <a:ext uri="{FF2B5EF4-FFF2-40B4-BE49-F238E27FC236}">
+                <a16:creationId xmlns:a16="http://schemas.microsoft.com/office/drawing/2014/main" id="{1CE976B7-2C07-A893-F5C7-07A97337340E}"/>
+              </a:ext>
+            </a:extLst>
+          </p:cNvPr>
           <p:cNvSpPr>
             <a:spLocks noGrp="1"/>
           </p:cNvSpPr>
           <p:nvPr>
             <p:ph type="title"/>
-          </p:nvPr>
-        </p:nvSpPr>
-        <p:spPr/>
-        <p:txBody>
-          <a:bodyPr/>
-          <a:lstStyle/>
-          <a:p>
-            <a:r>
-              <a:rPr lang="en-US"/>
-              <a:t>Click to edit Master title style</a:t>
-            </a:r>
-            <a:endParaRPr lang="en-US" dirty="0"/>
-          </a:p>
-        </p:txBody>
-      </p:sp>
-      <p:sp>
-        <p:nvSpPr>
-          <p:cNvPr id="3" name="Text Placeholder 2"/>
-          <p:cNvSpPr>
-            <a:spLocks noGrp="1"/>
-          </p:cNvSpPr>
-          <p:nvPr>
-            <p:ph type="body" idx="1"/>
           </p:nvPr>
         </p:nvSpPr>
         <p:spPr>
           <a:xfrm>
-            <a:off x="1143000" y="2001511"/>
-            <a:ext cx="4754880" cy="777240"/>
+            <a:off x="839788" y="365125"/>
+            <a:ext cx="10515600" cy="1325563"/>
           </a:xfrm>
         </p:spPr>
         <p:txBody>
-          <a:bodyPr anchor="ctr"/>
+          <a:bodyPr/>
+          <a:lstStyle/>
+          <a:p>
+            <a:r>
+              <a:rPr lang="en-US"/>
+              <a:t>Click to edit Master title style</a:t>
+            </a:r>
+            <a:endParaRPr lang="en-GB"/>
+          </a:p>
+        </p:txBody>
+      </p:sp>
+      <p:sp>
+        <p:nvSpPr>
+          <p:cNvPr id="3" name="Text Placeholder 2">
+            <a:extLst>
+              <a:ext uri="{FF2B5EF4-FFF2-40B4-BE49-F238E27FC236}">
+                <a16:creationId xmlns:a16="http://schemas.microsoft.com/office/drawing/2014/main" id="{6CAFD5FB-F4FF-B022-FE5F-6C459C49D6D6}"/>
+              </a:ext>
+            </a:extLst>
+          </p:cNvPr>
+          <p:cNvSpPr>
+            <a:spLocks noGrp="1"/>
+          </p:cNvSpPr>
+          <p:nvPr>
+            <p:ph type="body" idx="1"/>
+          </p:nvPr>
+        </p:nvSpPr>
+        <p:spPr>
+          <a:xfrm>
+            <a:off x="839788" y="1681163"/>
+            <a:ext cx="5157787" cy="823912"/>
+          </a:xfrm>
+        </p:spPr>
+        <p:txBody>
+          <a:bodyPr anchor="b"/>
           <a:lstStyle>
             <a:lvl1pPr marL="0" indent="0">
-              <a:spcBef>
-                <a:spcPts val="0"/>
-              </a:spcBef>
               <a:buNone/>
               <a:defRPr sz="2400" b="1"/>
             </a:lvl1pPr>
@@ -1626,7 +1614,13 @@
       </p:sp>
       <p:sp>
         <p:nvSpPr>
-          <p:cNvPr id="4" name="Content Placeholder 3"/>
+          <p:cNvPr id="4" name="Content Placeholder 3">
+            <a:extLst>
+              <a:ext uri="{FF2B5EF4-FFF2-40B4-BE49-F238E27FC236}">
+                <a16:creationId xmlns:a16="http://schemas.microsoft.com/office/drawing/2014/main" id="{AC592E6E-FA16-48F0-1130-22E9308D35BA}"/>
+              </a:ext>
+            </a:extLst>
+          </p:cNvPr>
           <p:cNvSpPr>
             <a:spLocks noGrp="1"/>
           </p:cNvSpPr>
@@ -1636,41 +1630,13 @@
         </p:nvSpPr>
         <p:spPr>
           <a:xfrm>
-            <a:off x="1143000" y="2721483"/>
-            <a:ext cx="4754880" cy="3383280"/>
+            <a:off x="839788" y="2505075"/>
+            <a:ext cx="5157787" cy="3684588"/>
           </a:xfrm>
         </p:spPr>
         <p:txBody>
           <a:bodyPr/>
-          <a:lstStyle>
-            <a:lvl1pPr>
-              <a:defRPr sz="2200"/>
-            </a:lvl1pPr>
-            <a:lvl2pPr>
-              <a:defRPr sz="2000"/>
-            </a:lvl2pPr>
-            <a:lvl3pPr>
-              <a:defRPr sz="1800"/>
-            </a:lvl3pPr>
-            <a:lvl4pPr>
-              <a:defRPr sz="1600"/>
-            </a:lvl4pPr>
-            <a:lvl5pPr>
-              <a:defRPr sz="1600"/>
-            </a:lvl5pPr>
-            <a:lvl6pPr>
-              <a:defRPr sz="1600"/>
-            </a:lvl6pPr>
-            <a:lvl7pPr>
-              <a:defRPr sz="1600"/>
-            </a:lvl7pPr>
-            <a:lvl8pPr>
-              <a:defRPr sz="1600"/>
-            </a:lvl8pPr>
-            <a:lvl9pPr>
-              <a:defRPr sz="1600"/>
-            </a:lvl9pPr>
-          </a:lstStyle>
+          <a:lstStyle/>
           <a:p>
             <a:pPr lvl="0"/>
             <a:r>
@@ -1705,13 +1671,19 @@
               <a:rPr lang="en-US"/>
               <a:t>Fifth level</a:t>
             </a:r>
-            <a:endParaRPr lang="en-US" dirty="0"/>
-          </a:p>
-        </p:txBody>
-      </p:sp>
-      <p:sp>
-        <p:nvSpPr>
-          <p:cNvPr id="5" name="Text Placeholder 4"/>
+            <a:endParaRPr lang="en-GB"/>
+          </a:p>
+        </p:txBody>
+      </p:sp>
+      <p:sp>
+        <p:nvSpPr>
+          <p:cNvPr id="5" name="Text Placeholder 4">
+            <a:extLst>
+              <a:ext uri="{FF2B5EF4-FFF2-40B4-BE49-F238E27FC236}">
+                <a16:creationId xmlns:a16="http://schemas.microsoft.com/office/drawing/2014/main" id="{4FF87177-9032-4EA8-4249-2E36EBF64C6A}"/>
+              </a:ext>
+            </a:extLst>
+          </p:cNvPr>
           <p:cNvSpPr>
             <a:spLocks noGrp="1"/>
           </p:cNvSpPr>
@@ -1721,17 +1693,14 @@
         </p:nvSpPr>
         <p:spPr>
           <a:xfrm>
-            <a:off x="6269173" y="1999032"/>
-            <a:ext cx="4754880" cy="777240"/>
+            <a:off x="6172200" y="1681163"/>
+            <a:ext cx="5183188" cy="823912"/>
           </a:xfrm>
         </p:spPr>
         <p:txBody>
-          <a:bodyPr anchor="ctr"/>
+          <a:bodyPr anchor="b"/>
           <a:lstStyle>
             <a:lvl1pPr marL="0" indent="0">
-              <a:spcBef>
-                <a:spcPts val="0"/>
-              </a:spcBef>
               <a:buNone/>
               <a:defRPr sz="2400" b="1"/>
             </a:lvl1pPr>
@@ -1779,7 +1748,13 @@
       </p:sp>
       <p:sp>
         <p:nvSpPr>
-          <p:cNvPr id="6" name="Content Placeholder 5"/>
+          <p:cNvPr id="6" name="Content Placeholder 5">
+            <a:extLst>
+              <a:ext uri="{FF2B5EF4-FFF2-40B4-BE49-F238E27FC236}">
+                <a16:creationId xmlns:a16="http://schemas.microsoft.com/office/drawing/2014/main" id="{F1197952-CEDD-22A5-DD77-64BE3A92A203}"/>
+              </a:ext>
+            </a:extLst>
+          </p:cNvPr>
           <p:cNvSpPr>
             <a:spLocks noGrp="1"/>
           </p:cNvSpPr>
@@ -1789,41 +1764,13 @@
         </p:nvSpPr>
         <p:spPr>
           <a:xfrm>
-            <a:off x="6269173" y="2719322"/>
-            <a:ext cx="4754880" cy="3383280"/>
+            <a:off x="6172200" y="2505075"/>
+            <a:ext cx="5183188" cy="3684588"/>
           </a:xfrm>
         </p:spPr>
         <p:txBody>
           <a:bodyPr/>
-          <a:lstStyle>
-            <a:lvl1pPr>
-              <a:defRPr sz="2200"/>
-            </a:lvl1pPr>
-            <a:lvl2pPr>
-              <a:defRPr sz="2000"/>
-            </a:lvl2pPr>
-            <a:lvl3pPr>
-              <a:defRPr sz="1800"/>
-            </a:lvl3pPr>
-            <a:lvl4pPr>
-              <a:defRPr sz="1600"/>
-            </a:lvl4pPr>
-            <a:lvl5pPr>
-              <a:defRPr sz="1600"/>
-            </a:lvl5pPr>
-            <a:lvl6pPr>
-              <a:defRPr sz="1600"/>
-            </a:lvl6pPr>
-            <a:lvl7pPr>
-              <a:defRPr sz="1600"/>
-            </a:lvl7pPr>
-            <a:lvl8pPr>
-              <a:defRPr sz="1600"/>
-            </a:lvl8pPr>
-            <a:lvl9pPr>
-              <a:defRPr sz="1600"/>
-            </a:lvl9pPr>
-          </a:lstStyle>
+          <a:lstStyle/>
           <a:p>
             <a:pPr lvl="0"/>
             <a:r>
@@ -1858,13 +1805,19 @@
               <a:rPr lang="en-US"/>
               <a:t>Fifth level</a:t>
             </a:r>
-            <a:endParaRPr lang="en-US" dirty="0"/>
-          </a:p>
-        </p:txBody>
-      </p:sp>
-      <p:sp>
-        <p:nvSpPr>
-          <p:cNvPr id="7" name="Date Placeholder 6"/>
+            <a:endParaRPr lang="en-GB"/>
+          </a:p>
+        </p:txBody>
+      </p:sp>
+      <p:sp>
+        <p:nvSpPr>
+          <p:cNvPr id="7" name="Date Placeholder 6">
+            <a:extLst>
+              <a:ext uri="{FF2B5EF4-FFF2-40B4-BE49-F238E27FC236}">
+                <a16:creationId xmlns:a16="http://schemas.microsoft.com/office/drawing/2014/main" id="{25F26AB9-F26E-FE93-8FBC-A8C4683811C8}"/>
+              </a:ext>
+            </a:extLst>
+          </p:cNvPr>
           <p:cNvSpPr>
             <a:spLocks noGrp="1"/>
           </p:cNvSpPr>
@@ -1879,7 +1832,7 @@
           <a:p>
             <a:fld id="{C2EF7422-D2C7-40BE-B8B2-27F6F564B2F4}" type="datetimeFigureOut">
               <a:rPr lang="en-GB" smtClean="0"/>
-              <a:t>23/10/2023</a:t>
+              <a:t>29/10/2023</a:t>
             </a:fld>
             <a:endParaRPr lang="en-GB"/>
           </a:p>
@@ -1887,7 +1840,13 @@
       </p:sp>
       <p:sp>
         <p:nvSpPr>
-          <p:cNvPr id="8" name="Footer Placeholder 7"/>
+          <p:cNvPr id="8" name="Footer Placeholder 7">
+            <a:extLst>
+              <a:ext uri="{FF2B5EF4-FFF2-40B4-BE49-F238E27FC236}">
+                <a16:creationId xmlns:a16="http://schemas.microsoft.com/office/drawing/2014/main" id="{FC652C2F-C01C-2434-3A3B-6FD750C26924}"/>
+              </a:ext>
+            </a:extLst>
+          </p:cNvPr>
           <p:cNvSpPr>
             <a:spLocks noGrp="1"/>
           </p:cNvSpPr>
@@ -1906,7 +1865,13 @@
       </p:sp>
       <p:sp>
         <p:nvSpPr>
-          <p:cNvPr id="9" name="Slide Number Placeholder 8"/>
+          <p:cNvPr id="9" name="Slide Number Placeholder 8">
+            <a:extLst>
+              <a:ext uri="{FF2B5EF4-FFF2-40B4-BE49-F238E27FC236}">
+                <a16:creationId xmlns:a16="http://schemas.microsoft.com/office/drawing/2014/main" id="{DC137F6B-DED4-9074-880B-08D91C5C6DB2}"/>
+              </a:ext>
+            </a:extLst>
+          </p:cNvPr>
           <p:cNvSpPr>
             <a:spLocks noGrp="1"/>
           </p:cNvSpPr>
@@ -1930,7 +1895,7 @@
     </p:spTree>
     <p:extLst>
       <p:ext uri="{BB962C8B-B14F-4D97-AF65-F5344CB8AC3E}">
-        <p14:creationId xmlns:p14="http://schemas.microsoft.com/office/powerpoint/2010/main" val="3937095033"/>
+        <p14:creationId xmlns:p14="http://schemas.microsoft.com/office/powerpoint/2010/main" val="2909122398"/>
       </p:ext>
     </p:extLst>
   </p:cSld>
@@ -1959,7 +1924,13 @@
       </p:grpSpPr>
       <p:sp>
         <p:nvSpPr>
-          <p:cNvPr id="2" name="Title 1"/>
+          <p:cNvPr id="2" name="Title 1">
+            <a:extLst>
+              <a:ext uri="{FF2B5EF4-FFF2-40B4-BE49-F238E27FC236}">
+                <a16:creationId xmlns:a16="http://schemas.microsoft.com/office/drawing/2014/main" id="{0952F304-1F34-2BFE-D05E-3FA66B8C0326}"/>
+              </a:ext>
+            </a:extLst>
+          </p:cNvPr>
           <p:cNvSpPr>
             <a:spLocks noGrp="1"/>
           </p:cNvSpPr>
@@ -1976,13 +1947,19 @@
               <a:rPr lang="en-US"/>
               <a:t>Click to edit Master title style</a:t>
             </a:r>
-            <a:endParaRPr lang="en-US" dirty="0"/>
-          </a:p>
-        </p:txBody>
-      </p:sp>
-      <p:sp>
-        <p:nvSpPr>
-          <p:cNvPr id="3" name="Date Placeholder 2"/>
+            <a:endParaRPr lang="en-GB"/>
+          </a:p>
+        </p:txBody>
+      </p:sp>
+      <p:sp>
+        <p:nvSpPr>
+          <p:cNvPr id="3" name="Date Placeholder 2">
+            <a:extLst>
+              <a:ext uri="{FF2B5EF4-FFF2-40B4-BE49-F238E27FC236}">
+                <a16:creationId xmlns:a16="http://schemas.microsoft.com/office/drawing/2014/main" id="{CDCB3FC3-2F0B-61F5-33A5-E91B41C71A6C}"/>
+              </a:ext>
+            </a:extLst>
+          </p:cNvPr>
           <p:cNvSpPr>
             <a:spLocks noGrp="1"/>
           </p:cNvSpPr>
@@ -1997,7 +1974,7 @@
           <a:p>
             <a:fld id="{C2EF7422-D2C7-40BE-B8B2-27F6F564B2F4}" type="datetimeFigureOut">
               <a:rPr lang="en-GB" smtClean="0"/>
-              <a:t>23/10/2023</a:t>
+              <a:t>29/10/2023</a:t>
             </a:fld>
             <a:endParaRPr lang="en-GB"/>
           </a:p>
@@ -2005,7 +1982,13 @@
       </p:sp>
       <p:sp>
         <p:nvSpPr>
-          <p:cNvPr id="4" name="Footer Placeholder 3"/>
+          <p:cNvPr id="4" name="Footer Placeholder 3">
+            <a:extLst>
+              <a:ext uri="{FF2B5EF4-FFF2-40B4-BE49-F238E27FC236}">
+                <a16:creationId xmlns:a16="http://schemas.microsoft.com/office/drawing/2014/main" id="{3721018A-0B61-95F7-167A-D2743C15FF1E}"/>
+              </a:ext>
+            </a:extLst>
+          </p:cNvPr>
           <p:cNvSpPr>
             <a:spLocks noGrp="1"/>
           </p:cNvSpPr>
@@ -2024,7 +2007,13 @@
       </p:sp>
       <p:sp>
         <p:nvSpPr>
-          <p:cNvPr id="5" name="Slide Number Placeholder 4"/>
+          <p:cNvPr id="5" name="Slide Number Placeholder 4">
+            <a:extLst>
+              <a:ext uri="{FF2B5EF4-FFF2-40B4-BE49-F238E27FC236}">
+                <a16:creationId xmlns:a16="http://schemas.microsoft.com/office/drawing/2014/main" id="{BDEDEC6F-97A1-2767-6835-F9E0A0D872B4}"/>
+              </a:ext>
+            </a:extLst>
+          </p:cNvPr>
           <p:cNvSpPr>
             <a:spLocks noGrp="1"/>
           </p:cNvSpPr>
@@ -2048,7 +2037,7 @@
     </p:spTree>
     <p:extLst>
       <p:ext uri="{BB962C8B-B14F-4D97-AF65-F5344CB8AC3E}">
-        <p14:creationId xmlns:p14="http://schemas.microsoft.com/office/powerpoint/2010/main" val="3523284267"/>
+        <p14:creationId xmlns:p14="http://schemas.microsoft.com/office/powerpoint/2010/main" val="470199479"/>
       </p:ext>
     </p:extLst>
   </p:cSld>
@@ -2077,7 +2066,13 @@
       </p:grpSpPr>
       <p:sp>
         <p:nvSpPr>
-          <p:cNvPr id="2" name="Date Placeholder 1"/>
+          <p:cNvPr id="2" name="Date Placeholder 1">
+            <a:extLst>
+              <a:ext uri="{FF2B5EF4-FFF2-40B4-BE49-F238E27FC236}">
+                <a16:creationId xmlns:a16="http://schemas.microsoft.com/office/drawing/2014/main" id="{41F097E4-0C6B-2FEA-77E1-8394B72649F7}"/>
+              </a:ext>
+            </a:extLst>
+          </p:cNvPr>
           <p:cNvSpPr>
             <a:spLocks noGrp="1"/>
           </p:cNvSpPr>
@@ -2092,7 +2087,7 @@
           <a:p>
             <a:fld id="{C2EF7422-D2C7-40BE-B8B2-27F6F564B2F4}" type="datetimeFigureOut">
               <a:rPr lang="en-GB" smtClean="0"/>
-              <a:t>23/10/2023</a:t>
+              <a:t>29/10/2023</a:t>
             </a:fld>
             <a:endParaRPr lang="en-GB"/>
           </a:p>
@@ -2100,7 +2095,13 @@
       </p:sp>
       <p:sp>
         <p:nvSpPr>
-          <p:cNvPr id="3" name="Footer Placeholder 2"/>
+          <p:cNvPr id="3" name="Footer Placeholder 2">
+            <a:extLst>
+              <a:ext uri="{FF2B5EF4-FFF2-40B4-BE49-F238E27FC236}">
+                <a16:creationId xmlns:a16="http://schemas.microsoft.com/office/drawing/2014/main" id="{F2721695-684C-B501-57FD-F0B45D1C3AAE}"/>
+              </a:ext>
+            </a:extLst>
+          </p:cNvPr>
           <p:cNvSpPr>
             <a:spLocks noGrp="1"/>
           </p:cNvSpPr>
@@ -2119,7 +2120,13 @@
       </p:sp>
       <p:sp>
         <p:nvSpPr>
-          <p:cNvPr id="4" name="Slide Number Placeholder 3"/>
+          <p:cNvPr id="4" name="Slide Number Placeholder 3">
+            <a:extLst>
+              <a:ext uri="{FF2B5EF4-FFF2-40B4-BE49-F238E27FC236}">
+                <a16:creationId xmlns:a16="http://schemas.microsoft.com/office/drawing/2014/main" id="{8D7C8A6B-DB3F-37FA-017A-2E7EA6C7FC55}"/>
+              </a:ext>
+            </a:extLst>
+          </p:cNvPr>
           <p:cNvSpPr>
             <a:spLocks noGrp="1"/>
           </p:cNvSpPr>
@@ -2143,7 +2150,7 @@
     </p:spTree>
     <p:extLst>
       <p:ext uri="{BB962C8B-B14F-4D97-AF65-F5344CB8AC3E}">
-        <p14:creationId xmlns:p14="http://schemas.microsoft.com/office/powerpoint/2010/main" val="2690868529"/>
+        <p14:creationId xmlns:p14="http://schemas.microsoft.com/office/powerpoint/2010/main" val="3341705209"/>
       </p:ext>
     </p:extLst>
   </p:cSld>
@@ -2172,7 +2179,13 @@
       </p:grpSpPr>
       <p:sp>
         <p:nvSpPr>
-          <p:cNvPr id="2" name="Title 1"/>
+          <p:cNvPr id="2" name="Title 1">
+            <a:extLst>
+              <a:ext uri="{FF2B5EF4-FFF2-40B4-BE49-F238E27FC236}">
+                <a16:creationId xmlns:a16="http://schemas.microsoft.com/office/drawing/2014/main" id="{AB123B4D-A84F-BABB-718D-60DEDE539826}"/>
+              </a:ext>
+            </a:extLst>
+          </p:cNvPr>
           <p:cNvSpPr>
             <a:spLocks noGrp="1"/>
           </p:cNvSpPr>
@@ -2182,20 +2195,15 @@
         </p:nvSpPr>
         <p:spPr>
           <a:xfrm>
-            <a:off x="1143000" y="1097280"/>
-            <a:ext cx="3931920" cy="1737360"/>
+            <a:off x="839788" y="457200"/>
+            <a:ext cx="3932237" cy="1600200"/>
           </a:xfrm>
         </p:spPr>
         <p:txBody>
-          <a:bodyPr anchor="b">
-            <a:noAutofit/>
-          </a:bodyPr>
+          <a:bodyPr anchor="b"/>
           <a:lstStyle>
             <a:lvl1pPr>
-              <a:lnSpc>
-                <a:spcPct val="90000"/>
-              </a:lnSpc>
-              <a:defRPr sz="4000" b="0"/>
+              <a:defRPr sz="3200"/>
             </a:lvl1pPr>
           </a:lstStyle>
           <a:p>
@@ -2203,13 +2211,19 @@
               <a:rPr lang="en-US"/>
               <a:t>Click to edit Master title style</a:t>
             </a:r>
-            <a:endParaRPr lang="en-US" dirty="0"/>
-          </a:p>
-        </p:txBody>
-      </p:sp>
-      <p:sp>
-        <p:nvSpPr>
-          <p:cNvPr id="3" name="Content Placeholder 2"/>
+            <a:endParaRPr lang="en-GB"/>
+          </a:p>
+        </p:txBody>
+      </p:sp>
+      <p:sp>
+        <p:nvSpPr>
+          <p:cNvPr id="3" name="Content Placeholder 2">
+            <a:extLst>
+              <a:ext uri="{FF2B5EF4-FFF2-40B4-BE49-F238E27FC236}">
+                <a16:creationId xmlns:a16="http://schemas.microsoft.com/office/drawing/2014/main" id="{FA819939-54C8-9F9F-46B6-EBAE418EFF58}"/>
+              </a:ext>
+            </a:extLst>
+          </p:cNvPr>
           <p:cNvSpPr>
             <a:spLocks noGrp="1"/>
           </p:cNvSpPr>
@@ -2219,8 +2233,8 @@
         </p:nvSpPr>
         <p:spPr>
           <a:xfrm>
-            <a:off x="5852159" y="1097280"/>
-            <a:ext cx="5212080" cy="4663440"/>
+            <a:off x="5183188" y="987425"/>
+            <a:ext cx="6172200" cy="4873625"/>
           </a:xfrm>
         </p:spPr>
         <p:txBody>
@@ -2288,13 +2302,19 @@
               <a:rPr lang="en-US"/>
               <a:t>Fifth level</a:t>
             </a:r>
-            <a:endParaRPr lang="en-US" dirty="0"/>
-          </a:p>
-        </p:txBody>
-      </p:sp>
-      <p:sp>
-        <p:nvSpPr>
-          <p:cNvPr id="4" name="Text Placeholder 3"/>
+            <a:endParaRPr lang="en-GB"/>
+          </a:p>
+        </p:txBody>
+      </p:sp>
+      <p:sp>
+        <p:nvSpPr>
+          <p:cNvPr id="4" name="Text Placeholder 3">
+            <a:extLst>
+              <a:ext uri="{FF2B5EF4-FFF2-40B4-BE49-F238E27FC236}">
+                <a16:creationId xmlns:a16="http://schemas.microsoft.com/office/drawing/2014/main" id="{56F2C8AF-E581-1DB3-93A8-F3E0D05C10E4}"/>
+              </a:ext>
+            </a:extLst>
+          </p:cNvPr>
           <p:cNvSpPr>
             <a:spLocks noGrp="1"/>
           </p:cNvSpPr>
@@ -2304,56 +2324,48 @@
         </p:nvSpPr>
         <p:spPr>
           <a:xfrm>
-            <a:off x="1143000" y="2834640"/>
-            <a:ext cx="3931920" cy="3017520"/>
+            <a:off x="839788" y="2057400"/>
+            <a:ext cx="3932237" cy="3811588"/>
           </a:xfrm>
         </p:spPr>
         <p:txBody>
-          <a:bodyPr>
-            <a:normAutofit/>
-          </a:bodyPr>
+          <a:bodyPr/>
           <a:lstStyle>
             <a:lvl1pPr marL="0" indent="0">
-              <a:lnSpc>
-                <a:spcPct val="100000"/>
-              </a:lnSpc>
-              <a:spcBef>
-                <a:spcPts val="1000"/>
-              </a:spcBef>
-              <a:buNone/>
-              <a:defRPr sz="1700"/>
+              <a:buNone/>
+              <a:defRPr sz="1600"/>
             </a:lvl1pPr>
             <a:lvl2pPr marL="457200" indent="0">
               <a:buNone/>
-              <a:defRPr sz="1200"/>
+              <a:defRPr sz="1400"/>
             </a:lvl2pPr>
             <a:lvl3pPr marL="914400" indent="0">
               <a:buNone/>
-              <a:defRPr sz="1000"/>
+              <a:defRPr sz="1200"/>
             </a:lvl3pPr>
             <a:lvl4pPr marL="1371600" indent="0">
               <a:buNone/>
-              <a:defRPr sz="900"/>
+              <a:defRPr sz="1000"/>
             </a:lvl4pPr>
             <a:lvl5pPr marL="1828800" indent="0">
               <a:buNone/>
-              <a:defRPr sz="900"/>
+              <a:defRPr sz="1000"/>
             </a:lvl5pPr>
             <a:lvl6pPr marL="2286000" indent="0">
               <a:buNone/>
-              <a:defRPr sz="900"/>
+              <a:defRPr sz="1000"/>
             </a:lvl6pPr>
             <a:lvl7pPr marL="2743200" indent="0">
               <a:buNone/>
-              <a:defRPr sz="900"/>
+              <a:defRPr sz="1000"/>
             </a:lvl7pPr>
             <a:lvl8pPr marL="3200400" indent="0">
               <a:buNone/>
-              <a:defRPr sz="900"/>
+              <a:defRPr sz="1000"/>
             </a:lvl8pPr>
             <a:lvl9pPr marL="3657600" indent="0">
               <a:buNone/>
-              <a:defRPr sz="900"/>
+              <a:defRPr sz="1000"/>
             </a:lvl9pPr>
           </a:lstStyle>
           <a:p>
@@ -2367,7 +2379,13 @@
       </p:sp>
       <p:sp>
         <p:nvSpPr>
-          <p:cNvPr id="5" name="Date Placeholder 4"/>
+          <p:cNvPr id="5" name="Date Placeholder 4">
+            <a:extLst>
+              <a:ext uri="{FF2B5EF4-FFF2-40B4-BE49-F238E27FC236}">
+                <a16:creationId xmlns:a16="http://schemas.microsoft.com/office/drawing/2014/main" id="{1FF2F756-9098-A0D1-B06E-12835EA91A01}"/>
+              </a:ext>
+            </a:extLst>
+          </p:cNvPr>
           <p:cNvSpPr>
             <a:spLocks noGrp="1"/>
           </p:cNvSpPr>
@@ -2382,7 +2400,7 @@
           <a:p>
             <a:fld id="{C2EF7422-D2C7-40BE-B8B2-27F6F564B2F4}" type="datetimeFigureOut">
               <a:rPr lang="en-GB" smtClean="0"/>
-              <a:t>23/10/2023</a:t>
+              <a:t>29/10/2023</a:t>
             </a:fld>
             <a:endParaRPr lang="en-GB"/>
           </a:p>
@@ -2390,7 +2408,13 @@
       </p:sp>
       <p:sp>
         <p:nvSpPr>
-          <p:cNvPr id="6" name="Footer Placeholder 5"/>
+          <p:cNvPr id="6" name="Footer Placeholder 5">
+            <a:extLst>
+              <a:ext uri="{FF2B5EF4-FFF2-40B4-BE49-F238E27FC236}">
+                <a16:creationId xmlns:a16="http://schemas.microsoft.com/office/drawing/2014/main" id="{48972C03-A715-25FC-D2B4-23F3825D30AE}"/>
+              </a:ext>
+            </a:extLst>
+          </p:cNvPr>
           <p:cNvSpPr>
             <a:spLocks noGrp="1"/>
           </p:cNvSpPr>
@@ -2409,7 +2433,13 @@
       </p:sp>
       <p:sp>
         <p:nvSpPr>
-          <p:cNvPr id="7" name="Slide Number Placeholder 6"/>
+          <p:cNvPr id="7" name="Slide Number Placeholder 6">
+            <a:extLst>
+              <a:ext uri="{FF2B5EF4-FFF2-40B4-BE49-F238E27FC236}">
+                <a16:creationId xmlns:a16="http://schemas.microsoft.com/office/drawing/2014/main" id="{82E7280F-2E82-6F59-AB61-BD560B4E9F4C}"/>
+              </a:ext>
+            </a:extLst>
+          </p:cNvPr>
           <p:cNvSpPr>
             <a:spLocks noGrp="1"/>
           </p:cNvSpPr>
@@ -2433,7 +2463,7 @@
     </p:spTree>
     <p:extLst>
       <p:ext uri="{BB962C8B-B14F-4D97-AF65-F5344CB8AC3E}">
-        <p14:creationId xmlns:p14="http://schemas.microsoft.com/office/powerpoint/2010/main" val="4203404500"/>
+        <p14:creationId xmlns:p14="http://schemas.microsoft.com/office/powerpoint/2010/main" val="2672690223"/>
       </p:ext>
     </p:extLst>
   </p:cSld>
@@ -2462,7 +2492,13 @@
       </p:grpSpPr>
       <p:sp>
         <p:nvSpPr>
-          <p:cNvPr id="2" name="Title 1"/>
+          <p:cNvPr id="2" name="Title 1">
+            <a:extLst>
+              <a:ext uri="{FF2B5EF4-FFF2-40B4-BE49-F238E27FC236}">
+                <a16:creationId xmlns:a16="http://schemas.microsoft.com/office/drawing/2014/main" id="{B76162BF-E6B0-919B-8013-4658D33AF711}"/>
+              </a:ext>
+            </a:extLst>
+          </p:cNvPr>
           <p:cNvSpPr>
             <a:spLocks noGrp="1"/>
           </p:cNvSpPr>
@@ -2472,20 +2508,15 @@
         </p:nvSpPr>
         <p:spPr>
           <a:xfrm>
-            <a:off x="1143000" y="1097280"/>
-            <a:ext cx="3931920" cy="1737360"/>
+            <a:off x="839788" y="457200"/>
+            <a:ext cx="3932237" cy="1600200"/>
           </a:xfrm>
         </p:spPr>
         <p:txBody>
-          <a:bodyPr anchor="b">
-            <a:noAutofit/>
-          </a:bodyPr>
+          <a:bodyPr anchor="b"/>
           <a:lstStyle>
             <a:lvl1pPr>
-              <a:lnSpc>
-                <a:spcPct val="90000"/>
-              </a:lnSpc>
-              <a:defRPr sz="4000" b="0"/>
+              <a:defRPr sz="3200"/>
             </a:lvl1pPr>
           </a:lstStyle>
           <a:p>
@@ -2493,15 +2524,21 @@
               <a:rPr lang="en-US"/>
               <a:t>Click to edit Master title style</a:t>
             </a:r>
-            <a:endParaRPr lang="en-US" dirty="0"/>
-          </a:p>
-        </p:txBody>
-      </p:sp>
-      <p:sp>
-        <p:nvSpPr>
-          <p:cNvPr id="3" name="Picture Placeholder 2"/>
-          <p:cNvSpPr>
-            <a:spLocks noGrp="1" noChangeAspect="1"/>
+            <a:endParaRPr lang="en-GB"/>
+          </a:p>
+        </p:txBody>
+      </p:sp>
+      <p:sp>
+        <p:nvSpPr>
+          <p:cNvPr id="3" name="Picture Placeholder 2">
+            <a:extLst>
+              <a:ext uri="{FF2B5EF4-FFF2-40B4-BE49-F238E27FC236}">
+                <a16:creationId xmlns:a16="http://schemas.microsoft.com/office/drawing/2014/main" id="{993BAD0F-FF49-FB55-C206-3C386E70F565}"/>
+              </a:ext>
+            </a:extLst>
+          </p:cNvPr>
+          <p:cNvSpPr>
+            <a:spLocks noGrp="1"/>
           </p:cNvSpPr>
           <p:nvPr>
             <p:ph type="pic" idx="1"/>
@@ -2509,18 +2546,16 @@
         </p:nvSpPr>
         <p:spPr>
           <a:xfrm>
-            <a:off x="5413248" y="1069847"/>
-            <a:ext cx="6099048" cy="4800600"/>
+            <a:off x="5183188" y="987425"/>
+            <a:ext cx="6172200" cy="4873625"/>
           </a:xfrm>
         </p:spPr>
         <p:txBody>
-          <a:bodyPr lIns="274320" tIns="182880" anchor="t">
-            <a:normAutofit/>
-          </a:bodyPr>
+          <a:bodyPr/>
           <a:lstStyle>
             <a:lvl1pPr marL="0" indent="0">
               <a:buNone/>
-              <a:defRPr sz="2800"/>
+              <a:defRPr sz="3200"/>
             </a:lvl1pPr>
             <a:lvl2pPr marL="457200" indent="0">
               <a:buNone/>
@@ -2556,17 +2591,19 @@
             </a:lvl9pPr>
           </a:lstStyle>
           <a:p>
-            <a:r>
-              <a:rPr lang="en-US"/>
-              <a:t>Click icon to add picture</a:t>
-            </a:r>
-            <a:endParaRPr lang="en-US" dirty="0"/>
-          </a:p>
-        </p:txBody>
-      </p:sp>
-      <p:sp>
-        <p:nvSpPr>
-          <p:cNvPr id="4" name="Text Placeholder 3"/>
+            <a:endParaRPr lang="en-GB"/>
+          </a:p>
+        </p:txBody>
+      </p:sp>
+      <p:sp>
+        <p:nvSpPr>
+          <p:cNvPr id="4" name="Text Placeholder 3">
+            <a:extLst>
+              <a:ext uri="{FF2B5EF4-FFF2-40B4-BE49-F238E27FC236}">
+                <a16:creationId xmlns:a16="http://schemas.microsoft.com/office/drawing/2014/main" id="{EB837D03-32FC-E506-32B9-8CD932A5347D}"/>
+              </a:ext>
+            </a:extLst>
+          </p:cNvPr>
           <p:cNvSpPr>
             <a:spLocks noGrp="1"/>
           </p:cNvSpPr>
@@ -2576,56 +2613,48 @@
         </p:nvSpPr>
         <p:spPr>
           <a:xfrm>
-            <a:off x="1143000" y="2834640"/>
-            <a:ext cx="3931920" cy="2880360"/>
+            <a:off x="839788" y="2057400"/>
+            <a:ext cx="3932237" cy="3811588"/>
           </a:xfrm>
         </p:spPr>
         <p:txBody>
-          <a:bodyPr>
-            <a:normAutofit/>
-          </a:bodyPr>
+          <a:bodyPr/>
           <a:lstStyle>
             <a:lvl1pPr marL="0" indent="0">
-              <a:lnSpc>
-                <a:spcPct val="100000"/>
-              </a:lnSpc>
-              <a:spcBef>
-                <a:spcPts val="1000"/>
-              </a:spcBef>
-              <a:buNone/>
-              <a:defRPr sz="1700"/>
+              <a:buNone/>
+              <a:defRPr sz="1600"/>
             </a:lvl1pPr>
             <a:lvl2pPr marL="457200" indent="0">
               <a:buNone/>
-              <a:defRPr sz="1200"/>
+              <a:defRPr sz="1400"/>
             </a:lvl2pPr>
             <a:lvl3pPr marL="914400" indent="0">
               <a:buNone/>
-              <a:defRPr sz="1000"/>
+              <a:defRPr sz="1200"/>
             </a:lvl3pPr>
             <a:lvl4pPr marL="1371600" indent="0">
               <a:buNone/>
-              <a:defRPr sz="900"/>
+              <a:defRPr sz="1000"/>
             </a:lvl4pPr>
             <a:lvl5pPr marL="1828800" indent="0">
               <a:buNone/>
-              <a:defRPr sz="900"/>
+              <a:defRPr sz="1000"/>
             </a:lvl5pPr>
             <a:lvl6pPr marL="2286000" indent="0">
               <a:buNone/>
-              <a:defRPr sz="900"/>
+              <a:defRPr sz="1000"/>
             </a:lvl6pPr>
             <a:lvl7pPr marL="2743200" indent="0">
               <a:buNone/>
-              <a:defRPr sz="900"/>
+              <a:defRPr sz="1000"/>
             </a:lvl7pPr>
             <a:lvl8pPr marL="3200400" indent="0">
               <a:buNone/>
-              <a:defRPr sz="900"/>
+              <a:defRPr sz="1000"/>
             </a:lvl8pPr>
             <a:lvl9pPr marL="3657600" indent="0">
               <a:buNone/>
-              <a:defRPr sz="900"/>
+              <a:defRPr sz="1000"/>
             </a:lvl9pPr>
           </a:lstStyle>
           <a:p>
@@ -2639,7 +2668,13 @@
       </p:sp>
       <p:sp>
         <p:nvSpPr>
-          <p:cNvPr id="5" name="Date Placeholder 4"/>
+          <p:cNvPr id="5" name="Date Placeholder 4">
+            <a:extLst>
+              <a:ext uri="{FF2B5EF4-FFF2-40B4-BE49-F238E27FC236}">
+                <a16:creationId xmlns:a16="http://schemas.microsoft.com/office/drawing/2014/main" id="{485EEC36-6E61-CB2F-C936-A552C0AE13E0}"/>
+              </a:ext>
+            </a:extLst>
+          </p:cNvPr>
           <p:cNvSpPr>
             <a:spLocks noGrp="1"/>
           </p:cNvSpPr>
@@ -2654,7 +2689,7 @@
           <a:p>
             <a:fld id="{C2EF7422-D2C7-40BE-B8B2-27F6F564B2F4}" type="datetimeFigureOut">
               <a:rPr lang="en-GB" smtClean="0"/>
-              <a:t>23/10/2023</a:t>
+              <a:t>29/10/2023</a:t>
             </a:fld>
             <a:endParaRPr lang="en-GB"/>
           </a:p>
@@ -2662,7 +2697,13 @@
       </p:sp>
       <p:sp>
         <p:nvSpPr>
-          <p:cNvPr id="6" name="Footer Placeholder 5"/>
+          <p:cNvPr id="6" name="Footer Placeholder 5">
+            <a:extLst>
+              <a:ext uri="{FF2B5EF4-FFF2-40B4-BE49-F238E27FC236}">
+                <a16:creationId xmlns:a16="http://schemas.microsoft.com/office/drawing/2014/main" id="{AB758DB7-6098-8740-06B3-AB43132F14D3}"/>
+              </a:ext>
+            </a:extLst>
+          </p:cNvPr>
           <p:cNvSpPr>
             <a:spLocks noGrp="1"/>
           </p:cNvSpPr>
@@ -2681,7 +2722,13 @@
       </p:sp>
       <p:sp>
         <p:nvSpPr>
-          <p:cNvPr id="7" name="Slide Number Placeholder 6"/>
+          <p:cNvPr id="7" name="Slide Number Placeholder 6">
+            <a:extLst>
+              <a:ext uri="{FF2B5EF4-FFF2-40B4-BE49-F238E27FC236}">
+                <a16:creationId xmlns:a16="http://schemas.microsoft.com/office/drawing/2014/main" id="{8F8B9A54-2E4D-9299-26A1-4FE88CCE59F4}"/>
+              </a:ext>
+            </a:extLst>
+          </p:cNvPr>
           <p:cNvSpPr>
             <a:spLocks noGrp="1"/>
           </p:cNvSpPr>
@@ -2705,7 +2752,7 @@
     </p:spTree>
     <p:extLst>
       <p:ext uri="{BB962C8B-B14F-4D97-AF65-F5344CB8AC3E}">
-        <p14:creationId xmlns:p14="http://schemas.microsoft.com/office/powerpoint/2010/main" val="1894045855"/>
+        <p14:creationId xmlns:p14="http://schemas.microsoft.com/office/powerpoint/2010/main" val="3335806816"/>
       </p:ext>
     </p:extLst>
   </p:cSld>
@@ -2719,12 +2766,9 @@
 <p:sldMaster xmlns:a="http://schemas.openxmlformats.org/drawingml/2006/main" xmlns:r="http://schemas.openxmlformats.org/officeDocument/2006/relationships" xmlns:p="http://schemas.openxmlformats.org/presentationml/2006/main">
   <p:cSld>
     <p:bg>
-      <p:bgPr>
-        <a:solidFill>
-          <a:schemeClr val="accent1"/>
-        </a:solidFill>
-        <a:effectLst/>
-      </p:bgPr>
+      <p:bgRef idx="1001">
+        <a:schemeClr val="bg1"/>
+      </p:bgRef>
     </p:bg>
     <p:spTree>
       <p:nvGrpSpPr>
@@ -2742,58 +2786,24 @@
       </p:grpSpPr>
       <p:sp>
         <p:nvSpPr>
-          <p:cNvPr id="7" name="Rectangle 6"/>
-          <p:cNvSpPr>
-            <a:spLocks noChangeAspect="1"/>
-          </p:cNvSpPr>
-          <p:nvPr/>
+          <p:cNvPr id="2" name="Title Placeholder 1">
+            <a:extLst>
+              <a:ext uri="{FF2B5EF4-FFF2-40B4-BE49-F238E27FC236}">
+                <a16:creationId xmlns:a16="http://schemas.microsoft.com/office/drawing/2014/main" id="{205C4637-286D-80D1-8B4D-E4DBF41C400F}"/>
+              </a:ext>
+            </a:extLst>
+          </p:cNvPr>
+          <p:cNvSpPr>
+            <a:spLocks noGrp="1"/>
+          </p:cNvSpPr>
+          <p:nvPr>
+            <p:ph type="title"/>
+          </p:nvPr>
         </p:nvSpPr>
         <p:spPr>
           <a:xfrm>
-            <a:off x="231140" y="243840"/>
-            <a:ext cx="11724640" cy="6377939"/>
-          </a:xfrm>
-          <a:prstGeom prst="rect">
-            <a:avLst/>
-          </a:prstGeom>
-          <a:solidFill>
-            <a:schemeClr val="bg1"/>
-          </a:solidFill>
-          <a:ln w="12700">
-            <a:noFill/>
-          </a:ln>
-        </p:spPr>
-        <p:style>
-          <a:lnRef idx="2">
-            <a:schemeClr val="accent1">
-              <a:shade val="50000"/>
-            </a:schemeClr>
-          </a:lnRef>
-          <a:fillRef idx="1">
-            <a:schemeClr val="accent1"/>
-          </a:fillRef>
-          <a:effectRef idx="0">
-            <a:schemeClr val="accent1"/>
-          </a:effectRef>
-          <a:fontRef idx="minor">
-            <a:schemeClr val="lt1"/>
-          </a:fontRef>
-        </p:style>
-      </p:sp>
-      <p:sp>
-        <p:nvSpPr>
-          <p:cNvPr id="2" name="Title Placeholder 1"/>
-          <p:cNvSpPr>
-            <a:spLocks noGrp="1"/>
-          </p:cNvSpPr>
-          <p:nvPr>
-            <p:ph type="title"/>
-          </p:nvPr>
-        </p:nvSpPr>
-        <p:spPr>
-          <a:xfrm>
-            <a:off x="1143000" y="609600"/>
-            <a:ext cx="9875520" cy="1356360"/>
+            <a:off x="838200" y="365125"/>
+            <a:ext cx="10515600" cy="1325563"/>
           </a:xfrm>
           <a:prstGeom prst="rect">
             <a:avLst/>
@@ -2809,13 +2819,19 @@
               <a:rPr lang="en-US"/>
               <a:t>Click to edit Master title style</a:t>
             </a:r>
-            <a:endParaRPr lang="en-US" dirty="0"/>
-          </a:p>
-        </p:txBody>
-      </p:sp>
-      <p:sp>
-        <p:nvSpPr>
-          <p:cNvPr id="3" name="Text Placeholder 2"/>
+            <a:endParaRPr lang="en-GB"/>
+          </a:p>
+        </p:txBody>
+      </p:sp>
+      <p:sp>
+        <p:nvSpPr>
+          <p:cNvPr id="3" name="Text Placeholder 2">
+            <a:extLst>
+              <a:ext uri="{FF2B5EF4-FFF2-40B4-BE49-F238E27FC236}">
+                <a16:creationId xmlns:a16="http://schemas.microsoft.com/office/drawing/2014/main" id="{A2F90EB7-3F84-E3B2-82ED-FD026AEADD0C}"/>
+              </a:ext>
+            </a:extLst>
+          </p:cNvPr>
           <p:cNvSpPr>
             <a:spLocks noGrp="1"/>
           </p:cNvSpPr>
@@ -2825,8 +2841,8 @@
         </p:nvSpPr>
         <p:spPr>
           <a:xfrm>
-            <a:off x="1143000" y="2057400"/>
-            <a:ext cx="9872871" cy="4038600"/>
+            <a:off x="838200" y="1825625"/>
+            <a:ext cx="10515600" cy="4351338"/>
           </a:xfrm>
           <a:prstGeom prst="rect">
             <a:avLst/>
@@ -2871,13 +2887,19 @@
               <a:rPr lang="en-US"/>
               <a:t>Fifth level</a:t>
             </a:r>
-            <a:endParaRPr lang="en-US" dirty="0"/>
-          </a:p>
-        </p:txBody>
-      </p:sp>
-      <p:sp>
-        <p:nvSpPr>
-          <p:cNvPr id="4" name="Date Placeholder 3"/>
+            <a:endParaRPr lang="en-GB"/>
+          </a:p>
+        </p:txBody>
+      </p:sp>
+      <p:sp>
+        <p:nvSpPr>
+          <p:cNvPr id="4" name="Date Placeholder 3">
+            <a:extLst>
+              <a:ext uri="{FF2B5EF4-FFF2-40B4-BE49-F238E27FC236}">
+                <a16:creationId xmlns:a16="http://schemas.microsoft.com/office/drawing/2014/main" id="{A21DE49D-A8B0-AC26-791A-8392A5CD87E1}"/>
+              </a:ext>
+            </a:extLst>
+          </p:cNvPr>
           <p:cNvSpPr>
             <a:spLocks noGrp="1"/>
           </p:cNvSpPr>
@@ -2887,8 +2909,8 @@
         </p:nvSpPr>
         <p:spPr>
           <a:xfrm>
-            <a:off x="1142996" y="6223828"/>
-            <a:ext cx="2329074" cy="365125"/>
+            <a:off x="838200" y="6356350"/>
+            <a:ext cx="2743200" cy="365125"/>
           </a:xfrm>
           <a:prstGeom prst="rect">
             <a:avLst/>
@@ -2900,7 +2922,9 @@
             <a:lvl1pPr algn="l">
               <a:defRPr sz="1200">
                 <a:solidFill>
-                  <a:schemeClr val="accent1"/>
+                  <a:schemeClr val="tx1">
+                    <a:tint val="75000"/>
+                  </a:schemeClr>
                 </a:solidFill>
               </a:defRPr>
             </a:lvl1pPr>
@@ -2908,7 +2932,7 @@
           <a:p>
             <a:fld id="{C2EF7422-D2C7-40BE-B8B2-27F6F564B2F4}" type="datetimeFigureOut">
               <a:rPr lang="en-GB" smtClean="0"/>
-              <a:t>23/10/2023</a:t>
+              <a:t>29/10/2023</a:t>
             </a:fld>
             <a:endParaRPr lang="en-GB"/>
           </a:p>
@@ -2916,7 +2940,13 @@
       </p:sp>
       <p:sp>
         <p:nvSpPr>
-          <p:cNvPr id="5" name="Footer Placeholder 4"/>
+          <p:cNvPr id="5" name="Footer Placeholder 4">
+            <a:extLst>
+              <a:ext uri="{FF2B5EF4-FFF2-40B4-BE49-F238E27FC236}">
+                <a16:creationId xmlns:a16="http://schemas.microsoft.com/office/drawing/2014/main" id="{DC77077E-ECE7-C5FC-2B43-E4A08CF03163}"/>
+              </a:ext>
+            </a:extLst>
+          </p:cNvPr>
           <p:cNvSpPr>
             <a:spLocks noGrp="1"/>
           </p:cNvSpPr>
@@ -2926,8 +2956,8 @@
         </p:nvSpPr>
         <p:spPr>
           <a:xfrm>
-            <a:off x="3949148" y="6223828"/>
-            <a:ext cx="4717774" cy="365125"/>
+            <a:off x="4038600" y="6356350"/>
+            <a:ext cx="4114800" cy="365125"/>
           </a:xfrm>
           <a:prstGeom prst="rect">
             <a:avLst/>
@@ -2939,7 +2969,9 @@
             <a:lvl1pPr algn="ctr">
               <a:defRPr sz="1200">
                 <a:solidFill>
-                  <a:schemeClr val="accent1"/>
+                  <a:schemeClr val="tx1">
+                    <a:tint val="75000"/>
+                  </a:schemeClr>
                 </a:solidFill>
               </a:defRPr>
             </a:lvl1pPr>
@@ -2951,7 +2983,13 @@
       </p:sp>
       <p:sp>
         <p:nvSpPr>
-          <p:cNvPr id="6" name="Slide Number Placeholder 5"/>
+          <p:cNvPr id="6" name="Slide Number Placeholder 5">
+            <a:extLst>
+              <a:ext uri="{FF2B5EF4-FFF2-40B4-BE49-F238E27FC236}">
+                <a16:creationId xmlns:a16="http://schemas.microsoft.com/office/drawing/2014/main" id="{DB521440-0B25-45AB-EDE4-21CCD4F1D3B6}"/>
+              </a:ext>
+            </a:extLst>
+          </p:cNvPr>
           <p:cNvSpPr>
             <a:spLocks noGrp="1"/>
           </p:cNvSpPr>
@@ -2961,8 +2999,8 @@
         </p:nvSpPr>
         <p:spPr>
           <a:xfrm>
-            <a:off x="9329530" y="6223828"/>
-            <a:ext cx="1706217" cy="365125"/>
+            <a:off x="8610600" y="6356350"/>
+            <a:ext cx="2743200" cy="365125"/>
           </a:xfrm>
           <a:prstGeom prst="rect">
             <a:avLst/>
@@ -2974,7 +3012,9 @@
             <a:lvl1pPr algn="r">
               <a:defRPr sz="1200">
                 <a:solidFill>
-                  <a:schemeClr val="accent1"/>
+                  <a:schemeClr val="tx1">
+                    <a:tint val="75000"/>
+                  </a:schemeClr>
                 </a:solidFill>
               </a:defRPr>
             </a:lvl1pPr>
@@ -2991,23 +3031,23 @@
     </p:spTree>
     <p:extLst>
       <p:ext uri="{BB962C8B-B14F-4D97-AF65-F5344CB8AC3E}">
-        <p14:creationId xmlns:p14="http://schemas.microsoft.com/office/powerpoint/2010/main" val="1027494807"/>
+        <p14:creationId xmlns:p14="http://schemas.microsoft.com/office/powerpoint/2010/main" val="3774757357"/>
       </p:ext>
     </p:extLst>
   </p:cSld>
   <p:clrMap bg1="lt1" tx1="dk1" bg2="lt2" tx2="dk2" accent1="accent1" accent2="accent2" accent3="accent3" accent4="accent4" accent5="accent5" accent6="accent6" hlink="hlink" folHlink="folHlink"/>
   <p:sldLayoutIdLst>
-    <p:sldLayoutId id="2147483709" r:id="rId1"/>
-    <p:sldLayoutId id="2147483710" r:id="rId2"/>
-    <p:sldLayoutId id="2147483711" r:id="rId3"/>
-    <p:sldLayoutId id="2147483712" r:id="rId4"/>
-    <p:sldLayoutId id="2147483713" r:id="rId5"/>
-    <p:sldLayoutId id="2147483714" r:id="rId6"/>
-    <p:sldLayoutId id="2147483715" r:id="rId7"/>
-    <p:sldLayoutId id="2147483716" r:id="rId8"/>
-    <p:sldLayoutId id="2147483717" r:id="rId9"/>
-    <p:sldLayoutId id="2147483718" r:id="rId10"/>
-    <p:sldLayoutId id="2147483719" r:id="rId11"/>
+    <p:sldLayoutId id="2147483721" r:id="rId1"/>
+    <p:sldLayoutId id="2147483722" r:id="rId2"/>
+    <p:sldLayoutId id="2147483723" r:id="rId3"/>
+    <p:sldLayoutId id="2147483724" r:id="rId4"/>
+    <p:sldLayoutId id="2147483725" r:id="rId5"/>
+    <p:sldLayoutId id="2147483726" r:id="rId6"/>
+    <p:sldLayoutId id="2147483727" r:id="rId7"/>
+    <p:sldLayoutId id="2147483728" r:id="rId8"/>
+    <p:sldLayoutId id="2147483729" r:id="rId9"/>
+    <p:sldLayoutId id="2147483730" r:id="rId10"/>
+    <p:sldLayoutId id="2147483731" r:id="rId11"/>
   </p:sldLayoutIdLst>
   <p:txStyles>
     <p:titleStyle>
@@ -3021,7 +3061,7 @@
         <a:buNone/>
         <a:defRPr sz="4400" kern="1200">
           <a:solidFill>
-            <a:schemeClr val="accent1"/>
+            <a:schemeClr val="tx1"/>
           </a:solidFill>
           <a:latin typeface="+mj-lt"/>
           <a:ea typeface="+mj-ea"/>
@@ -3030,222 +3070,162 @@
       </a:lvl1pPr>
     </p:titleStyle>
     <p:bodyStyle>
-      <a:lvl1pPr marL="228600" indent="-182880" algn="l" defTabSz="914400" rtl="0" eaLnBrk="1" latinLnBrk="0" hangingPunct="1">
+      <a:lvl1pPr marL="228600" indent="-228600" algn="l" defTabSz="914400" rtl="0" eaLnBrk="1" latinLnBrk="0" hangingPunct="1">
         <a:lnSpc>
           <a:spcPct val="90000"/>
         </a:lnSpc>
         <a:spcBef>
-          <a:spcPts val="1400"/>
+          <a:spcPts val="1000"/>
         </a:spcBef>
-        <a:buClr>
-          <a:schemeClr val="accent1"/>
-        </a:buClr>
-        <a:buSzPct val="80000"/>
-        <a:buFont typeface="Corbel" pitchFamily="34" charset="0"/>
+        <a:buFont typeface="Arial" panose="020B0604020202020204" pitchFamily="34" charset="0"/>
         <a:buChar char="•"/>
-        <a:defRPr sz="2200" kern="1200">
+        <a:defRPr sz="2800" kern="1200">
           <a:solidFill>
-            <a:schemeClr val="accent1"/>
+            <a:schemeClr val="tx1"/>
           </a:solidFill>
           <a:latin typeface="+mn-lt"/>
           <a:ea typeface="+mn-ea"/>
           <a:cs typeface="+mn-cs"/>
         </a:defRPr>
       </a:lvl1pPr>
-      <a:lvl2pPr marL="457200" indent="-182880" algn="l" defTabSz="914400" rtl="0" eaLnBrk="1" latinLnBrk="0" hangingPunct="1">
+      <a:lvl2pPr marL="685800" indent="-228600" algn="l" defTabSz="914400" rtl="0" eaLnBrk="1" latinLnBrk="0" hangingPunct="1">
         <a:lnSpc>
           <a:spcPct val="90000"/>
         </a:lnSpc>
         <a:spcBef>
-          <a:spcPts val="200"/>
+          <a:spcPts val="500"/>
         </a:spcBef>
-        <a:spcAft>
-          <a:spcPts val="400"/>
-        </a:spcAft>
-        <a:buClr>
-          <a:schemeClr val="accent1"/>
-        </a:buClr>
-        <a:buSzPct val="80000"/>
-        <a:buFont typeface="Corbel" pitchFamily="34" charset="0"/>
+        <a:buFont typeface="Arial" panose="020B0604020202020204" pitchFamily="34" charset="0"/>
         <a:buChar char="•"/>
-        <a:defRPr sz="2000" kern="1200">
+        <a:defRPr sz="2400" kern="1200">
           <a:solidFill>
-            <a:schemeClr val="accent1"/>
+            <a:schemeClr val="tx1"/>
           </a:solidFill>
           <a:latin typeface="+mn-lt"/>
           <a:ea typeface="+mn-ea"/>
           <a:cs typeface="+mn-cs"/>
         </a:defRPr>
       </a:lvl2pPr>
-      <a:lvl3pPr marL="731520" indent="-182880" algn="l" defTabSz="914400" rtl="0" eaLnBrk="1" latinLnBrk="0" hangingPunct="1">
+      <a:lvl3pPr marL="1143000" indent="-228600" algn="l" defTabSz="914400" rtl="0" eaLnBrk="1" latinLnBrk="0" hangingPunct="1">
         <a:lnSpc>
           <a:spcPct val="90000"/>
         </a:lnSpc>
         <a:spcBef>
-          <a:spcPts val="200"/>
+          <a:spcPts val="500"/>
         </a:spcBef>
-        <a:spcAft>
-          <a:spcPts val="400"/>
-        </a:spcAft>
-        <a:buClr>
-          <a:schemeClr val="accent1"/>
-        </a:buClr>
-        <a:buSzPct val="80000"/>
-        <a:buFont typeface="Corbel" pitchFamily="34" charset="0"/>
+        <a:buFont typeface="Arial" panose="020B0604020202020204" pitchFamily="34" charset="0"/>
         <a:buChar char="•"/>
-        <a:defRPr sz="1800" kern="1200">
+        <a:defRPr sz="2000" kern="1200">
           <a:solidFill>
-            <a:schemeClr val="accent1"/>
+            <a:schemeClr val="tx1"/>
           </a:solidFill>
           <a:latin typeface="+mn-lt"/>
           <a:ea typeface="+mn-ea"/>
           <a:cs typeface="+mn-cs"/>
         </a:defRPr>
       </a:lvl3pPr>
-      <a:lvl4pPr marL="1005840" indent="-182880" algn="l" defTabSz="914400" rtl="0" eaLnBrk="1" latinLnBrk="0" hangingPunct="1">
+      <a:lvl4pPr marL="1600200" indent="-228600" algn="l" defTabSz="914400" rtl="0" eaLnBrk="1" latinLnBrk="0" hangingPunct="1">
         <a:lnSpc>
           <a:spcPct val="90000"/>
         </a:lnSpc>
         <a:spcBef>
-          <a:spcPts val="200"/>
+          <a:spcPts val="500"/>
         </a:spcBef>
-        <a:spcAft>
-          <a:spcPts val="400"/>
-        </a:spcAft>
-        <a:buClr>
-          <a:schemeClr val="accent1"/>
-        </a:buClr>
-        <a:buSzPct val="80000"/>
-        <a:buFont typeface="Corbel" pitchFamily="34" charset="0"/>
+        <a:buFont typeface="Arial" panose="020B0604020202020204" pitchFamily="34" charset="0"/>
         <a:buChar char="•"/>
-        <a:defRPr sz="1600" kern="1200">
+        <a:defRPr sz="1800" kern="1200">
           <a:solidFill>
-            <a:schemeClr val="accent1"/>
+            <a:schemeClr val="tx1"/>
           </a:solidFill>
           <a:latin typeface="+mn-lt"/>
           <a:ea typeface="+mn-ea"/>
           <a:cs typeface="+mn-cs"/>
         </a:defRPr>
       </a:lvl4pPr>
-      <a:lvl5pPr marL="1280160" indent="-182880" algn="l" defTabSz="914400" rtl="0" eaLnBrk="1" latinLnBrk="0" hangingPunct="1">
+      <a:lvl5pPr marL="2057400" indent="-228600" algn="l" defTabSz="914400" rtl="0" eaLnBrk="1" latinLnBrk="0" hangingPunct="1">
         <a:lnSpc>
           <a:spcPct val="90000"/>
         </a:lnSpc>
         <a:spcBef>
-          <a:spcPts val="200"/>
+          <a:spcPts val="500"/>
         </a:spcBef>
-        <a:spcAft>
-          <a:spcPts val="400"/>
-        </a:spcAft>
-        <a:buClr>
-          <a:schemeClr val="accent1"/>
-        </a:buClr>
-        <a:buSzPct val="80000"/>
-        <a:buFont typeface="Corbel" pitchFamily="34" charset="0"/>
+        <a:buFont typeface="Arial" panose="020B0604020202020204" pitchFamily="34" charset="0"/>
         <a:buChar char="•"/>
-        <a:defRPr sz="1600" kern="1200">
+        <a:defRPr sz="1800" kern="1200">
           <a:solidFill>
-            <a:schemeClr val="accent1"/>
+            <a:schemeClr val="tx1"/>
           </a:solidFill>
           <a:latin typeface="+mn-lt"/>
           <a:ea typeface="+mn-ea"/>
           <a:cs typeface="+mn-cs"/>
         </a:defRPr>
       </a:lvl5pPr>
-      <a:lvl6pPr marL="1600000" indent="-228600" algn="l" defTabSz="914400" rtl="0" eaLnBrk="1" latinLnBrk="0" hangingPunct="1">
+      <a:lvl6pPr marL="2514600" indent="-228600" algn="l" defTabSz="914400" rtl="0" eaLnBrk="1" latinLnBrk="0" hangingPunct="1">
         <a:lnSpc>
           <a:spcPct val="90000"/>
         </a:lnSpc>
         <a:spcBef>
-          <a:spcPts val="200"/>
+          <a:spcPts val="500"/>
         </a:spcBef>
-        <a:spcAft>
-          <a:spcPts val="400"/>
-        </a:spcAft>
-        <a:buClr>
-          <a:schemeClr val="accent1"/>
-        </a:buClr>
-        <a:buSzPct val="80000"/>
-        <a:buFont typeface="Corbel" pitchFamily="34" charset="0"/>
+        <a:buFont typeface="Arial" panose="020B0604020202020204" pitchFamily="34" charset="0"/>
         <a:buChar char="•"/>
-        <a:defRPr sz="1600" kern="1200">
+        <a:defRPr sz="1800" kern="1200">
           <a:solidFill>
-            <a:schemeClr val="accent1"/>
+            <a:schemeClr val="tx1"/>
           </a:solidFill>
           <a:latin typeface="+mn-lt"/>
           <a:ea typeface="+mn-ea"/>
           <a:cs typeface="+mn-cs"/>
         </a:defRPr>
       </a:lvl6pPr>
-      <a:lvl7pPr marL="1900000" indent="-228600" algn="l" defTabSz="914400" rtl="0" eaLnBrk="1" latinLnBrk="0" hangingPunct="1">
+      <a:lvl7pPr marL="2971800" indent="-228600" algn="l" defTabSz="914400" rtl="0" eaLnBrk="1" latinLnBrk="0" hangingPunct="1">
         <a:lnSpc>
           <a:spcPct val="90000"/>
         </a:lnSpc>
         <a:spcBef>
-          <a:spcPts val="200"/>
+          <a:spcPts val="500"/>
         </a:spcBef>
-        <a:spcAft>
-          <a:spcPts val="400"/>
-        </a:spcAft>
-        <a:buClr>
-          <a:schemeClr val="accent1"/>
-        </a:buClr>
-        <a:buSzPct val="80000"/>
-        <a:buFont typeface="Corbel" pitchFamily="34" charset="0"/>
+        <a:buFont typeface="Arial" panose="020B0604020202020204" pitchFamily="34" charset="0"/>
         <a:buChar char="•"/>
-        <a:defRPr sz="1600" kern="1200">
+        <a:defRPr sz="1800" kern="1200">
           <a:solidFill>
-            <a:schemeClr val="accent1"/>
+            <a:schemeClr val="tx1"/>
           </a:solidFill>
           <a:latin typeface="+mn-lt"/>
           <a:ea typeface="+mn-ea"/>
           <a:cs typeface="+mn-cs"/>
         </a:defRPr>
       </a:lvl7pPr>
-      <a:lvl8pPr marL="2200000" indent="-228600" algn="l" defTabSz="914400" rtl="0" eaLnBrk="1" latinLnBrk="0" hangingPunct="1">
+      <a:lvl8pPr marL="3429000" indent="-228600" algn="l" defTabSz="914400" rtl="0" eaLnBrk="1" latinLnBrk="0" hangingPunct="1">
         <a:lnSpc>
           <a:spcPct val="90000"/>
         </a:lnSpc>
         <a:spcBef>
-          <a:spcPts val="200"/>
+          <a:spcPts val="500"/>
         </a:spcBef>
-        <a:spcAft>
-          <a:spcPts val="400"/>
-        </a:spcAft>
-        <a:buClr>
-          <a:schemeClr val="accent1"/>
-        </a:buClr>
-        <a:buSzPct val="80000"/>
-        <a:buFont typeface="Corbel" pitchFamily="34" charset="0"/>
+        <a:buFont typeface="Arial" panose="020B0604020202020204" pitchFamily="34" charset="0"/>
         <a:buChar char="•"/>
-        <a:defRPr sz="1600" kern="1200">
+        <a:defRPr sz="1800" kern="1200">
           <a:solidFill>
-            <a:schemeClr val="accent1"/>
+            <a:schemeClr val="tx1"/>
           </a:solidFill>
           <a:latin typeface="+mn-lt"/>
           <a:ea typeface="+mn-ea"/>
           <a:cs typeface="+mn-cs"/>
         </a:defRPr>
       </a:lvl8pPr>
-      <a:lvl9pPr marL="2500000" indent="-228600" algn="l" defTabSz="914400" rtl="0" eaLnBrk="1" latinLnBrk="0" hangingPunct="1">
+      <a:lvl9pPr marL="3886200" indent="-228600" algn="l" defTabSz="914400" rtl="0" eaLnBrk="1" latinLnBrk="0" hangingPunct="1">
         <a:lnSpc>
           <a:spcPct val="90000"/>
         </a:lnSpc>
         <a:spcBef>
-          <a:spcPts val="200"/>
+          <a:spcPts val="500"/>
         </a:spcBef>
-        <a:spcAft>
-          <a:spcPts val="400"/>
-        </a:spcAft>
-        <a:buClr>
-          <a:schemeClr val="accent1"/>
-        </a:buClr>
-        <a:buSzPct val="80000"/>
-        <a:buFont typeface="Corbel" pitchFamily="34" charset="0"/>
+        <a:buFont typeface="Arial" panose="020B0604020202020204" pitchFamily="34" charset="0"/>
         <a:buChar char="•"/>
-        <a:defRPr sz="1600" kern="1200">
+        <a:defRPr sz="1800" kern="1200">
           <a:solidFill>
-            <a:schemeClr val="accent1"/>
+            <a:schemeClr val="tx1"/>
           </a:solidFill>
           <a:latin typeface="+mn-lt"/>
           <a:ea typeface="+mn-ea"/>
@@ -4195,58 +4175,110 @@
 </file>
 
 <file path=ppt/theme/theme1.xml><?xml version="1.0" encoding="utf-8"?>
-<a:theme xmlns:a="http://schemas.openxmlformats.org/drawingml/2006/main" name="Basis">
+<a:theme xmlns:a="http://schemas.openxmlformats.org/drawingml/2006/main" name="Office Theme">
   <a:themeElements>
-    <a:clrScheme name="Basis">
+    <a:clrScheme name="Office">
       <a:dk1>
-        <a:srgbClr val="000000"/>
+        <a:sysClr val="windowText" lastClr="000000"/>
       </a:dk1>
       <a:lt1>
-        <a:srgbClr val="FFFFFF"/>
+        <a:sysClr val="window" lastClr="FFFFFF"/>
       </a:lt1>
       <a:dk2>
-        <a:srgbClr val="565349"/>
+        <a:srgbClr val="44546A"/>
       </a:dk2>
       <a:lt2>
-        <a:srgbClr val="DDDDDD"/>
+        <a:srgbClr val="E7E6E6"/>
       </a:lt2>
       <a:accent1>
-        <a:srgbClr val="A6B727"/>
+        <a:srgbClr val="4472C4"/>
       </a:accent1>
       <a:accent2>
-        <a:srgbClr val="DF5327"/>
+        <a:srgbClr val="ED7D31"/>
       </a:accent2>
       <a:accent3>
-        <a:srgbClr val="FE9E00"/>
+        <a:srgbClr val="A5A5A5"/>
       </a:accent3>
       <a:accent4>
-        <a:srgbClr val="418AB3"/>
+        <a:srgbClr val="FFC000"/>
       </a:accent4>
       <a:accent5>
-        <a:srgbClr val="D7D447"/>
+        <a:srgbClr val="5B9BD5"/>
       </a:accent5>
       <a:accent6>
-        <a:srgbClr val="818183"/>
+        <a:srgbClr val="70AD47"/>
       </a:accent6>
       <a:hlink>
-        <a:srgbClr val="F59E00"/>
+        <a:srgbClr val="0563C1"/>
       </a:hlink>
       <a:folHlink>
-        <a:srgbClr val="B2B2B2"/>
+        <a:srgbClr val="954F72"/>
       </a:folHlink>
     </a:clrScheme>
-    <a:fontScheme name="Basis">
+    <a:fontScheme name="Office">
       <a:majorFont>
-        <a:latin typeface="Corbel" panose="020B0503020204020204"/>
+        <a:latin typeface="Calibri Light" panose="020F0302020204030204"/>
         <a:ea typeface=""/>
         <a:cs typeface=""/>
-        <a:font script="Jpan" typeface="ＭＳ ゴシック"/>
+        <a:font script="Jpan" typeface="游ゴシック Light"/>
         <a:font script="Hang" typeface="맑은 고딕"/>
-        <a:font script="Hans" typeface="宋体"/>
+        <a:font script="Hans" typeface="等线 Light"/>
         <a:font script="Hant" typeface="新細明體"/>
-        <a:font script="Arab" typeface="Tahoma"/>
-        <a:font script="Hebr" typeface="Gisha"/>
-        <a:font script="Thai" typeface="DilleniaUPC"/>
+        <a:font script="Arab" typeface="Times New Roman"/>
+        <a:font script="Hebr" typeface="Times New Roman"/>
+        <a:font script="Thai" typeface="Angsana New"/>
+        <a:font script="Ethi" typeface="Nyala"/>
+        <a:font script="Beng" typeface="Vrinda"/>
+        <a:font script="Gujr" typeface="Shruti"/>
+        <a:font script="Khmr" typeface="MoolBoran"/>
+        <a:font script="Knda" typeface="Tunga"/>
+        <a:font script="Guru" typeface="Raavi"/>
+        <a:font script="Cans" typeface="Euphemia"/>
+        <a:font script="Cher" typeface="Plantagenet Cherokee"/>
+        <a:font script="Yiii" typeface="Microsoft Yi Baiti"/>
+        <a:font script="Tibt" typeface="Microsoft Himalaya"/>
+        <a:font script="Thaa" typeface="MV Boli"/>
+        <a:font script="Deva" typeface="Mangal"/>
+        <a:font script="Telu" typeface="Gautami"/>
+        <a:font script="Taml" typeface="Latha"/>
+        <a:font script="Syrc" typeface="Estrangelo Edessa"/>
+        <a:font script="Orya" typeface="Kalinga"/>
+        <a:font script="Mlym" typeface="Kartika"/>
+        <a:font script="Laoo" typeface="DokChampa"/>
+        <a:font script="Sinh" typeface="Iskoola Pota"/>
+        <a:font script="Mong" typeface="Mongolian Baiti"/>
+        <a:font script="Viet" typeface="Times New Roman"/>
+        <a:font script="Uigh" typeface="Microsoft Uighur"/>
+        <a:font script="Geor" typeface="Sylfaen"/>
+        <a:font script="Armn" typeface="Arial"/>
+        <a:font script="Bugi" typeface="Leelawadee UI"/>
+        <a:font script="Bopo" typeface="Microsoft JhengHei"/>
+        <a:font script="Java" typeface="Javanese Text"/>
+        <a:font script="Lisu" typeface="Segoe UI"/>
+        <a:font script="Mymr" typeface="Myanmar Text"/>
+        <a:font script="Nkoo" typeface="Ebrima"/>
+        <a:font script="Olck" typeface="Nirmala UI"/>
+        <a:font script="Osma" typeface="Ebrima"/>
+        <a:font script="Phag" typeface="Phagspa"/>
+        <a:font script="Syrn" typeface="Estrangelo Edessa"/>
+        <a:font script="Syrj" typeface="Estrangelo Edessa"/>
+        <a:font script="Syre" typeface="Estrangelo Edessa"/>
+        <a:font script="Sora" typeface="Nirmala UI"/>
+        <a:font script="Tale" typeface="Microsoft Tai Le"/>
+        <a:font script="Talu" typeface="Microsoft New Tai Lue"/>
+        <a:font script="Tfng" typeface="Ebrima"/>
+      </a:majorFont>
+      <a:minorFont>
+        <a:latin typeface="Calibri" panose="020F0502020204030204"/>
+        <a:ea typeface=""/>
+        <a:cs typeface=""/>
+        <a:font script="Jpan" typeface="游ゴシック"/>
+        <a:font script="Hang" typeface="맑은 고딕"/>
+        <a:font script="Hans" typeface="等线"/>
+        <a:font script="Hant" typeface="新細明體"/>
+        <a:font script="Arab" typeface="Arial"/>
+        <a:font script="Hebr" typeface="Arial"/>
+        <a:font script="Thai" typeface="Cordia New"/>
         <a:font script="Ethi" typeface="Nyala"/>
         <a:font script="Beng" typeface="Vrinda"/>
         <a:font script="Gujr" typeface="Shruti"/>
@@ -4267,98 +4299,107 @@
         <a:font script="Laoo" typeface="DokChampa"/>
         <a:font script="Sinh" typeface="Iskoola Pota"/>
         <a:font script="Mong" typeface="Mongolian Baiti"/>
-        <a:font script="Viet" typeface="Tahoma"/>
+        <a:font script="Viet" typeface="Arial"/>
         <a:font script="Uigh" typeface="Microsoft Uighur"/>
         <a:font script="Geor" typeface="Sylfaen"/>
-      </a:majorFont>
-      <a:minorFont>
-        <a:latin typeface="Corbel" panose="020B0503020204020204"/>
-        <a:ea typeface=""/>
-        <a:cs typeface=""/>
-        <a:font script="Jpan" typeface="ＭＳ ゴシック"/>
-        <a:font script="Hang" typeface="맑은 고딕"/>
-        <a:font script="Hans" typeface="宋体"/>
-        <a:font script="Hant" typeface="新細明體"/>
-        <a:font script="Arab" typeface="Tahoma"/>
-        <a:font script="Hebr" typeface="Gisha"/>
-        <a:font script="Thai" typeface="DilleniaUPC"/>
-        <a:font script="Ethi" typeface="Nyala"/>
-        <a:font script="Beng" typeface="Vrinda"/>
-        <a:font script="Gujr" typeface="Shruti"/>
-        <a:font script="Khmr" typeface="DaunPenh"/>
-        <a:font script="Knda" typeface="Tunga"/>
-        <a:font script="Guru" typeface="Raavi"/>
-        <a:font script="Cans" typeface="Euphemia"/>
-        <a:font script="Cher" typeface="Plantagenet Cherokee"/>
-        <a:font script="Yiii" typeface="Microsoft Yi Baiti"/>
-        <a:font script="Tibt" typeface="Microsoft Himalaya"/>
-        <a:font script="Thaa" typeface="MV Boli"/>
-        <a:font script="Deva" typeface="Mangal"/>
-        <a:font script="Telu" typeface="Gautami"/>
-        <a:font script="Taml" typeface="Latha"/>
-        <a:font script="Syrc" typeface="Estrangelo Edessa"/>
-        <a:font script="Orya" typeface="Kalinga"/>
-        <a:font script="Mlym" typeface="Kartika"/>
-        <a:font script="Laoo" typeface="DokChampa"/>
-        <a:font script="Sinh" typeface="Iskoola Pota"/>
-        <a:font script="Mong" typeface="Mongolian Baiti"/>
-        <a:font script="Viet" typeface="Verdana"/>
-        <a:font script="Uigh" typeface="Microsoft Uighur"/>
-        <a:font script="Geor" typeface="Sylfaen"/>
+        <a:font script="Armn" typeface="Arial"/>
+        <a:font script="Bugi" typeface="Leelawadee UI"/>
+        <a:font script="Bopo" typeface="Microsoft JhengHei"/>
+        <a:font script="Java" typeface="Javanese Text"/>
+        <a:font script="Lisu" typeface="Segoe UI"/>
+        <a:font script="Mymr" typeface="Myanmar Text"/>
+        <a:font script="Nkoo" typeface="Ebrima"/>
+        <a:font script="Olck" typeface="Nirmala UI"/>
+        <a:font script="Osma" typeface="Ebrima"/>
+        <a:font script="Phag" typeface="Phagspa"/>
+        <a:font script="Syrn" typeface="Estrangelo Edessa"/>
+        <a:font script="Syrj" typeface="Estrangelo Edessa"/>
+        <a:font script="Syre" typeface="Estrangelo Edessa"/>
+        <a:font script="Sora" typeface="Nirmala UI"/>
+        <a:font script="Tale" typeface="Microsoft Tai Le"/>
+        <a:font script="Talu" typeface="Microsoft New Tai Lue"/>
+        <a:font script="Tfng" typeface="Ebrima"/>
       </a:minorFont>
     </a:fontScheme>
-    <a:fmtScheme name="Basis">
+    <a:fmtScheme name="Office">
       <a:fillStyleLst>
         <a:solidFill>
           <a:schemeClr val="phClr"/>
         </a:solidFill>
-        <a:solidFill>
-          <a:schemeClr val="phClr">
-            <a:tint val="55000"/>
-            <a:satMod val="130000"/>
-          </a:schemeClr>
-        </a:solidFill>
         <a:gradFill rotWithShape="1">
           <a:gsLst>
             <a:gs pos="0">
-              <a:schemeClr val="phClr"/>
+              <a:schemeClr val="phClr">
+                <a:lumMod val="110000"/>
+                <a:satMod val="105000"/>
+                <a:tint val="67000"/>
+              </a:schemeClr>
             </a:gs>
-            <a:gs pos="90000">
+            <a:gs pos="50000">
               <a:schemeClr val="phClr">
-                <a:shade val="100000"/>
-                <a:satMod val="105000"/>
+                <a:lumMod val="105000"/>
+                <a:satMod val="103000"/>
+                <a:tint val="73000"/>
               </a:schemeClr>
             </a:gs>
             <a:gs pos="100000">
               <a:schemeClr val="phClr">
-                <a:shade val="80000"/>
-                <a:satMod val="120000"/>
+                <a:lumMod val="105000"/>
+                <a:satMod val="109000"/>
+                <a:tint val="81000"/>
               </a:schemeClr>
             </a:gs>
           </a:gsLst>
-          <a:path path="circle">
-            <a:fillToRect l="100000" t="100000" r="100000" b="100000"/>
-          </a:path>
+          <a:lin ang="5400000" scaled="0"/>
+        </a:gradFill>
+        <a:gradFill rotWithShape="1">
+          <a:gsLst>
+            <a:gs pos="0">
+              <a:schemeClr val="phClr">
+                <a:satMod val="103000"/>
+                <a:lumMod val="102000"/>
+                <a:tint val="94000"/>
+              </a:schemeClr>
+            </a:gs>
+            <a:gs pos="50000">
+              <a:schemeClr val="phClr">
+                <a:satMod val="110000"/>
+                <a:lumMod val="100000"/>
+                <a:shade val="100000"/>
+              </a:schemeClr>
+            </a:gs>
+            <a:gs pos="100000">
+              <a:schemeClr val="phClr">
+                <a:lumMod val="99000"/>
+                <a:satMod val="120000"/>
+                <a:shade val="78000"/>
+              </a:schemeClr>
+            </a:gs>
+          </a:gsLst>
+          <a:lin ang="5400000" scaled="0"/>
         </a:gradFill>
       </a:fillStyleLst>
       <a:lnStyleLst>
-        <a:ln w="10000" cap="flat" cmpd="sng" algn="ctr">
+        <a:ln w="6350" cap="flat" cmpd="sng" algn="ctr">
           <a:solidFill>
             <a:schemeClr val="phClr"/>
           </a:solidFill>
           <a:prstDash val="solid"/>
+          <a:miter lim="800000"/>
+        </a:ln>
+        <a:ln w="12700" cap="flat" cmpd="sng" algn="ctr">
+          <a:solidFill>
+            <a:schemeClr val="phClr"/>
+          </a:solidFill>
+          <a:prstDash val="solid"/>
+          <a:miter lim="800000"/>
         </a:ln>
         <a:ln w="19050" cap="flat" cmpd="sng" algn="ctr">
           <a:solidFill>
             <a:schemeClr val="phClr"/>
           </a:solidFill>
           <a:prstDash val="solid"/>
-        </a:ln>
-        <a:ln w="53975" cap="flat" cmpd="dbl" algn="ctr">
-          <a:solidFill>
-            <a:schemeClr val="phClr"/>
-          </a:solidFill>
-          <a:prstDash val="solid"/>
+          <a:miter lim="800000"/>
         </a:ln>
       </a:lnStyleLst>
       <a:effectStyleLst>
@@ -4366,37 +4407,16 @@
           <a:effectLst/>
         </a:effectStyle>
         <a:effectStyle>
+          <a:effectLst/>
+        </a:effectStyle>
+        <a:effectStyle>
           <a:effectLst>
-            <a:outerShdw blurRad="38100" dist="25400" dir="5400000" rotWithShape="0">
+            <a:outerShdw blurRad="57150" dist="19050" dir="5400000" algn="ctr" rotWithShape="0">
               <a:srgbClr val="000000">
-                <a:alpha val="45000"/>
+                <a:alpha val="63000"/>
               </a:srgbClr>
             </a:outerShdw>
           </a:effectLst>
-        </a:effectStyle>
-        <a:effectStyle>
-          <a:effectLst>
-            <a:outerShdw blurRad="38100" dist="25400" dir="5400000" rotWithShape="0">
-              <a:srgbClr val="000000">
-                <a:alpha val="45000"/>
-              </a:srgbClr>
-            </a:outerShdw>
-          </a:effectLst>
-          <a:scene3d>
-            <a:camera prst="orthographicFront">
-              <a:rot lat="0" lon="0" rev="0"/>
-            </a:camera>
-            <a:lightRig rig="brightRoom" dir="t"/>
-          </a:scene3d>
-          <a:sp3d extrusionH="12700" contourW="25400" prstMaterial="flat">
-            <a:bevelT w="63500" h="152400" prst="angle"/>
-            <a:contourClr>
-              <a:schemeClr val="phClr">
-                <a:shade val="27000"/>
-                <a:satMod val="120000"/>
-              </a:schemeClr>
-            </a:contourClr>
-          </a:sp3d>
         </a:effectStyle>
       </a:effectStyleLst>
       <a:bgFillStyleLst>
@@ -4406,18 +4426,36 @@
         <a:solidFill>
           <a:schemeClr val="phClr">
             <a:tint val="95000"/>
-            <a:shade val="95000"/>
-            <a:satMod val="140000"/>
+            <a:satMod val="170000"/>
           </a:schemeClr>
         </a:solidFill>
-        <a:solidFill>
-          <a:schemeClr val="phClr">
-            <a:tint val="90000"/>
-            <a:shade val="85000"/>
-            <a:satMod val="160000"/>
-            <a:lumMod val="110000"/>
-          </a:schemeClr>
-        </a:solidFill>
+        <a:gradFill rotWithShape="1">
+          <a:gsLst>
+            <a:gs pos="0">
+              <a:schemeClr val="phClr">
+                <a:tint val="93000"/>
+                <a:satMod val="150000"/>
+                <a:shade val="98000"/>
+                <a:lumMod val="102000"/>
+              </a:schemeClr>
+            </a:gs>
+            <a:gs pos="50000">
+              <a:schemeClr val="phClr">
+                <a:tint val="98000"/>
+                <a:satMod val="130000"/>
+                <a:shade val="90000"/>
+                <a:lumMod val="103000"/>
+              </a:schemeClr>
+            </a:gs>
+            <a:gs pos="100000">
+              <a:schemeClr val="phClr">
+                <a:shade val="63000"/>
+                <a:satMod val="120000"/>
+              </a:schemeClr>
+            </a:gs>
+          </a:gsLst>
+          <a:lin ang="5400000" scaled="0"/>
+        </a:gradFill>
       </a:bgFillStyleLst>
     </a:fmtScheme>
   </a:themeElements>
@@ -4425,7 +4463,7 @@
   <a:extraClrSchemeLst/>
   <a:extLst>
     <a:ext uri="{05A4C25C-085E-4340-85A3-A5531E510DB2}">
-      <thm15:themeFamily xmlns:thm15="http://schemas.microsoft.com/office/thememl/2012/main" name="Basis" id="{5665723A-49BA-4B57-8411-A56F8F207965}" vid="{90E45F77-AEFC-46EF-A7C1-5B338C297B02}"/>
+      <thm15:themeFamily xmlns:thm15="http://schemas.microsoft.com/office/thememl/2012/main" name="Office Theme" id="{62F939B6-93AF-4DB8-9C6B-D6C7DFDC589F}" vid="{4A3C46E8-61CC-4603-A589-7422A47A8E4A}"/>
     </a:ext>
   </a:extLst>
 </a:theme>

</xml_diff>